<commit_message>
Actualizacion manual usuario y manual tecnico
</commit_message>
<xml_diff>
--- a/assets/docs/Trimestre V/03_Manual_Técnico/CANCHEROS manual tecnico.pptx
+++ b/assets/docs/Trimestre V/03_Manual_Técnico/CANCHEROS manual tecnico.pptx
@@ -5,7 +5,7 @@
     <p:sldMasterId id="2147483648" r:id="rId1"/>
   </p:sldMasterIdLst>
   <p:notesMasterIdLst>
-    <p:notesMasterId r:id="rId9"/>
+    <p:notesMasterId r:id="rId12"/>
   </p:notesMasterIdLst>
   <p:sldIdLst>
     <p:sldId id="257" r:id="rId2"/>
@@ -14,7 +14,10 @@
     <p:sldId id="260" r:id="rId5"/>
     <p:sldId id="261" r:id="rId6"/>
     <p:sldId id="262" r:id="rId7"/>
-    <p:sldId id="263" r:id="rId8"/>
+    <p:sldId id="264" r:id="rId8"/>
+    <p:sldId id="265" r:id="rId9"/>
+    <p:sldId id="266" r:id="rId10"/>
+    <p:sldId id="263" r:id="rId11"/>
   </p:sldIdLst>
   <p:sldSz cx="12192000" cy="6858000"/>
   <p:notesSz cx="6858000" cy="9144000"/>
@@ -203,7 +206,7 @@
           <a:p>
             <a:fld id="{3C171018-4928-4208-B0C3-73246FD391F9}" type="datetimeFigureOut">
               <a:rPr lang="es-MX" smtClean="0"/>
-              <a:t>30/08/2024</a:t>
+              <a:t>12/09/2024</a:t>
             </a:fld>
             <a:endParaRPr lang="es-MX"/>
           </a:p>
@@ -704,7 +707,7 @@
           <a:p>
             <a:fld id="{CF5AA1CF-6A8C-4725-BC41-E6A15E1FD51E}" type="datetimeFigureOut">
               <a:rPr lang="es-MX" smtClean="0"/>
-              <a:t>30/08/2024</a:t>
+              <a:t>12/09/2024</a:t>
             </a:fld>
             <a:endParaRPr lang="es-MX"/>
           </a:p>
@@ -904,7 +907,7 @@
           <a:p>
             <a:fld id="{CF5AA1CF-6A8C-4725-BC41-E6A15E1FD51E}" type="datetimeFigureOut">
               <a:rPr lang="es-MX" smtClean="0"/>
-              <a:t>30/08/2024</a:t>
+              <a:t>12/09/2024</a:t>
             </a:fld>
             <a:endParaRPr lang="es-MX"/>
           </a:p>
@@ -1114,7 +1117,7 @@
           <a:p>
             <a:fld id="{CF5AA1CF-6A8C-4725-BC41-E6A15E1FD51E}" type="datetimeFigureOut">
               <a:rPr lang="es-MX" smtClean="0"/>
-              <a:t>30/08/2024</a:t>
+              <a:t>12/09/2024</a:t>
             </a:fld>
             <a:endParaRPr lang="es-MX"/>
           </a:p>
@@ -1314,7 +1317,7 @@
           <a:p>
             <a:fld id="{CF5AA1CF-6A8C-4725-BC41-E6A15E1FD51E}" type="datetimeFigureOut">
               <a:rPr lang="es-MX" smtClean="0"/>
-              <a:t>30/08/2024</a:t>
+              <a:t>12/09/2024</a:t>
             </a:fld>
             <a:endParaRPr lang="es-MX"/>
           </a:p>
@@ -1590,7 +1593,7 @@
           <a:p>
             <a:fld id="{CF5AA1CF-6A8C-4725-BC41-E6A15E1FD51E}" type="datetimeFigureOut">
               <a:rPr lang="es-MX" smtClean="0"/>
-              <a:t>30/08/2024</a:t>
+              <a:t>12/09/2024</a:t>
             </a:fld>
             <a:endParaRPr lang="es-MX"/>
           </a:p>
@@ -1858,7 +1861,7 @@
           <a:p>
             <a:fld id="{CF5AA1CF-6A8C-4725-BC41-E6A15E1FD51E}" type="datetimeFigureOut">
               <a:rPr lang="es-MX" smtClean="0"/>
-              <a:t>30/08/2024</a:t>
+              <a:t>12/09/2024</a:t>
             </a:fld>
             <a:endParaRPr lang="es-MX"/>
           </a:p>
@@ -2273,7 +2276,7 @@
           <a:p>
             <a:fld id="{CF5AA1CF-6A8C-4725-BC41-E6A15E1FD51E}" type="datetimeFigureOut">
               <a:rPr lang="es-MX" smtClean="0"/>
-              <a:t>30/08/2024</a:t>
+              <a:t>12/09/2024</a:t>
             </a:fld>
             <a:endParaRPr lang="es-MX"/>
           </a:p>
@@ -2415,7 +2418,7 @@
           <a:p>
             <a:fld id="{CF5AA1CF-6A8C-4725-BC41-E6A15E1FD51E}" type="datetimeFigureOut">
               <a:rPr lang="es-MX" smtClean="0"/>
-              <a:t>30/08/2024</a:t>
+              <a:t>12/09/2024</a:t>
             </a:fld>
             <a:endParaRPr lang="es-MX"/>
           </a:p>
@@ -2528,7 +2531,7 @@
           <a:p>
             <a:fld id="{CF5AA1CF-6A8C-4725-BC41-E6A15E1FD51E}" type="datetimeFigureOut">
               <a:rPr lang="es-MX" smtClean="0"/>
-              <a:t>30/08/2024</a:t>
+              <a:t>12/09/2024</a:t>
             </a:fld>
             <a:endParaRPr lang="es-MX"/>
           </a:p>
@@ -2841,7 +2844,7 @@
           <a:p>
             <a:fld id="{CF5AA1CF-6A8C-4725-BC41-E6A15E1FD51E}" type="datetimeFigureOut">
               <a:rPr lang="es-MX" smtClean="0"/>
-              <a:t>30/08/2024</a:t>
+              <a:t>12/09/2024</a:t>
             </a:fld>
             <a:endParaRPr lang="es-MX"/>
           </a:p>
@@ -3130,7 +3133,7 @@
           <a:p>
             <a:fld id="{CF5AA1CF-6A8C-4725-BC41-E6A15E1FD51E}" type="datetimeFigureOut">
               <a:rPr lang="es-MX" smtClean="0"/>
-              <a:t>30/08/2024</a:t>
+              <a:t>12/09/2024</a:t>
             </a:fld>
             <a:endParaRPr lang="es-MX"/>
           </a:p>
@@ -3373,7 +3376,7 @@
           <a:p>
             <a:fld id="{CF5AA1CF-6A8C-4725-BC41-E6A15E1FD51E}" type="datetimeFigureOut">
               <a:rPr lang="es-MX" smtClean="0"/>
-              <a:t>30/08/2024</a:t>
+              <a:t>12/09/2024</a:t>
             </a:fld>
             <a:endParaRPr lang="es-MX"/>
           </a:p>
@@ -4925,6 +4928,1334 @@
 </p:sld>
 </file>
 
+<file path=ppt/slides/slide10.xml><?xml version="1.0" encoding="utf-8"?>
+<p:sld xmlns:a="http://schemas.openxmlformats.org/drawingml/2006/main" xmlns:r="http://schemas.openxmlformats.org/officeDocument/2006/relationships" xmlns:p="http://schemas.openxmlformats.org/presentationml/2006/main">
+  <p:cSld>
+    <p:spTree>
+      <p:nvGrpSpPr>
+        <p:cNvPr id="1" name=""/>
+        <p:cNvGrpSpPr/>
+        <p:nvPr/>
+      </p:nvGrpSpPr>
+      <p:grpSpPr>
+        <a:xfrm>
+          <a:off x="0" y="0"/>
+          <a:ext cx="0" cy="0"/>
+          <a:chOff x="0" y="0"/>
+          <a:chExt cx="0" cy="0"/>
+        </a:xfrm>
+      </p:grpSpPr>
+      <p:sp>
+        <p:nvSpPr>
+          <p:cNvPr id="2" name="object 2">
+            <a:extLst>
+              <a:ext uri="{FF2B5EF4-FFF2-40B4-BE49-F238E27FC236}">
+                <a16:creationId xmlns:a16="http://schemas.microsoft.com/office/drawing/2014/main" id="{A97EDF9E-5660-7809-B50A-8970BA799752}"/>
+              </a:ext>
+            </a:extLst>
+          </p:cNvPr>
+          <p:cNvSpPr txBox="1"/>
+          <p:nvPr/>
+        </p:nvSpPr>
+        <p:spPr>
+          <a:xfrm>
+            <a:off x="1726221" y="739672"/>
+            <a:ext cx="10057740" cy="1137684"/>
+          </a:xfrm>
+          <a:prstGeom prst="rect">
+            <a:avLst/>
+          </a:prstGeom>
+        </p:spPr>
+        <p:txBody>
+          <a:bodyPr vert="horz" wrap="square" lIns="0" tIns="12700" rIns="0" bIns="0" rtlCol="0">
+            <a:spAutoFit/>
+          </a:bodyPr>
+          <a:lstStyle/>
+          <a:p>
+            <a:pPr marL="12700">
+              <a:lnSpc>
+                <a:spcPct val="100000"/>
+              </a:lnSpc>
+              <a:spcBef>
+                <a:spcPts val="100"/>
+              </a:spcBef>
+            </a:pPr>
+            <a:r>
+              <a:rPr sz="1400" b="1" dirty="0">
+                <a:latin typeface="Calibri"/>
+                <a:cs typeface="Calibri"/>
+              </a:rPr>
+              <a:t>EJECUCIÓN</a:t>
+            </a:r>
+            <a:r>
+              <a:rPr sz="1400" b="1" spc="-30" dirty="0">
+                <a:latin typeface="Calibri"/>
+                <a:cs typeface="Calibri"/>
+              </a:rPr>
+              <a:t> </a:t>
+            </a:r>
+            <a:r>
+              <a:rPr sz="1400" b="1" spc="-5" dirty="0">
+                <a:latin typeface="Calibri"/>
+                <a:cs typeface="Calibri"/>
+              </a:rPr>
+              <a:t>DEL</a:t>
+            </a:r>
+            <a:r>
+              <a:rPr sz="1400" b="1" spc="-25" dirty="0">
+                <a:latin typeface="Calibri"/>
+                <a:cs typeface="Calibri"/>
+              </a:rPr>
+              <a:t> </a:t>
+            </a:r>
+            <a:r>
+              <a:rPr sz="1400" b="1" spc="-5" dirty="0">
+                <a:latin typeface="Calibri"/>
+                <a:cs typeface="Calibri"/>
+              </a:rPr>
+              <a:t>APLICATIVO</a:t>
+            </a:r>
+            <a:endParaRPr sz="1400" dirty="0">
+              <a:latin typeface="Calibri"/>
+              <a:cs typeface="Calibri"/>
+            </a:endParaRPr>
+          </a:p>
+          <a:p>
+            <a:pPr>
+              <a:lnSpc>
+                <a:spcPct val="100000"/>
+              </a:lnSpc>
+              <a:spcBef>
+                <a:spcPts val="45"/>
+              </a:spcBef>
+            </a:pPr>
+            <a:endParaRPr sz="1400" dirty="0">
+              <a:latin typeface="Calibri"/>
+              <a:cs typeface="Calibri"/>
+            </a:endParaRPr>
+          </a:p>
+          <a:p>
+            <a:pPr marL="12700" marR="1890395">
+              <a:lnSpc>
+                <a:spcPct val="170000"/>
+              </a:lnSpc>
+              <a:spcBef>
+                <a:spcPts val="5"/>
+              </a:spcBef>
+            </a:pPr>
+            <a:r>
+              <a:rPr sz="1400" dirty="0">
+                <a:latin typeface="Calibri"/>
+                <a:cs typeface="Calibri"/>
+              </a:rPr>
+              <a:t>para la ejecución </a:t>
+            </a:r>
+            <a:r>
+              <a:rPr sz="1400" spc="-5" dirty="0">
+                <a:latin typeface="Calibri"/>
+                <a:cs typeface="Calibri"/>
+              </a:rPr>
+              <a:t>del aplicativo debemos </a:t>
+            </a:r>
+            <a:r>
+              <a:rPr sz="1400" dirty="0">
+                <a:latin typeface="Calibri"/>
+                <a:cs typeface="Calibri"/>
+              </a:rPr>
+              <a:t>ingresar a la </a:t>
+            </a:r>
+            <a:r>
+              <a:rPr sz="1400" dirty="0" err="1">
+                <a:latin typeface="Calibri"/>
+                <a:cs typeface="Calibri"/>
+              </a:rPr>
+              <a:t>ruta</a:t>
+            </a:r>
+            <a:r>
+              <a:rPr sz="1400" dirty="0">
+                <a:latin typeface="Calibri"/>
+                <a:cs typeface="Calibri"/>
+              </a:rPr>
+              <a:t> </a:t>
+            </a:r>
+            <a:r>
+              <a:rPr sz="1400" spc="-235" dirty="0">
+                <a:latin typeface="Calibri"/>
+                <a:cs typeface="Calibri"/>
+              </a:rPr>
+              <a:t> </a:t>
+            </a:r>
+            <a:r>
+              <a:rPr lang="es-MX" sz="1400" u="sng" spc="-5" dirty="0">
+                <a:solidFill>
+                  <a:srgbClr val="0462C1"/>
+                </a:solidFill>
+                <a:uFill>
+                  <a:solidFill>
+                    <a:srgbClr val="0462C1"/>
+                  </a:solidFill>
+                </a:uFill>
+                <a:latin typeface="Calibri"/>
+                <a:cs typeface="Calibri"/>
+              </a:rPr>
+              <a:t>127.0.0.1..8000</a:t>
+            </a:r>
+            <a:endParaRPr sz="1400" dirty="0">
+              <a:latin typeface="Calibri"/>
+              <a:cs typeface="Calibri"/>
+            </a:endParaRPr>
+          </a:p>
+          <a:p>
+            <a:pPr marL="12700" marR="5080">
+              <a:lnSpc>
+                <a:spcPct val="110000"/>
+              </a:lnSpc>
+              <a:spcBef>
+                <a:spcPts val="795"/>
+              </a:spcBef>
+            </a:pPr>
+            <a:r>
+              <a:rPr sz="1400" dirty="0">
+                <a:latin typeface="Calibri"/>
+                <a:cs typeface="Calibri"/>
+              </a:rPr>
+              <a:t>Al</a:t>
+            </a:r>
+            <a:r>
+              <a:rPr sz="1400" spc="-5" dirty="0">
+                <a:latin typeface="Calibri"/>
+                <a:cs typeface="Calibri"/>
+              </a:rPr>
+              <a:t> </a:t>
+            </a:r>
+            <a:r>
+              <a:rPr sz="1400" dirty="0">
+                <a:latin typeface="Calibri"/>
+                <a:cs typeface="Calibri"/>
+              </a:rPr>
+              <a:t>ingresar</a:t>
+            </a:r>
+            <a:r>
+              <a:rPr sz="1400" spc="5" dirty="0">
+                <a:latin typeface="Calibri"/>
+                <a:cs typeface="Calibri"/>
+              </a:rPr>
+              <a:t> </a:t>
+            </a:r>
+            <a:r>
+              <a:rPr sz="1400" dirty="0">
+                <a:latin typeface="Calibri"/>
+                <a:cs typeface="Calibri"/>
+              </a:rPr>
+              <a:t>al</a:t>
+            </a:r>
+            <a:r>
+              <a:rPr sz="1400" spc="5" dirty="0">
+                <a:latin typeface="Calibri"/>
+                <a:cs typeface="Calibri"/>
+              </a:rPr>
+              <a:t> </a:t>
+            </a:r>
+            <a:r>
+              <a:rPr sz="1400" spc="-5" dirty="0">
+                <a:latin typeface="Calibri"/>
+                <a:cs typeface="Calibri"/>
+              </a:rPr>
+              <a:t>navegador</a:t>
+            </a:r>
+            <a:r>
+              <a:rPr sz="1400" spc="5" dirty="0">
+                <a:latin typeface="Calibri"/>
+                <a:cs typeface="Calibri"/>
+              </a:rPr>
+              <a:t> </a:t>
+            </a:r>
+            <a:r>
+              <a:rPr sz="1400" spc="-5" dirty="0">
+                <a:latin typeface="Calibri"/>
+                <a:cs typeface="Calibri"/>
+              </a:rPr>
+              <a:t>esta</a:t>
+            </a:r>
+            <a:r>
+              <a:rPr sz="1400" dirty="0">
+                <a:latin typeface="Calibri"/>
+                <a:cs typeface="Calibri"/>
+              </a:rPr>
+              <a:t> ruta,</a:t>
+            </a:r>
+            <a:r>
+              <a:rPr sz="1400" spc="-5" dirty="0">
+                <a:latin typeface="Calibri"/>
+                <a:cs typeface="Calibri"/>
+              </a:rPr>
+              <a:t> </a:t>
+            </a:r>
+            <a:r>
+              <a:rPr sz="1400" dirty="0">
+                <a:latin typeface="Calibri"/>
+                <a:cs typeface="Calibri"/>
+              </a:rPr>
+              <a:t>es</a:t>
+            </a:r>
+            <a:r>
+              <a:rPr sz="1400" spc="10" dirty="0">
+                <a:latin typeface="Calibri"/>
+                <a:cs typeface="Calibri"/>
+              </a:rPr>
+              <a:t> </a:t>
+            </a:r>
+            <a:r>
+              <a:rPr sz="1400" spc="-5" dirty="0">
+                <a:latin typeface="Calibri"/>
+                <a:cs typeface="Calibri"/>
+              </a:rPr>
+              <a:t>posible </a:t>
+            </a:r>
+            <a:r>
+              <a:rPr sz="1400" dirty="0">
+                <a:latin typeface="Calibri"/>
+                <a:cs typeface="Calibri"/>
+              </a:rPr>
+              <a:t>evidenciar </a:t>
+            </a:r>
+            <a:r>
+              <a:rPr sz="1400" spc="-5" dirty="0">
+                <a:latin typeface="Calibri"/>
+                <a:cs typeface="Calibri"/>
+              </a:rPr>
+              <a:t>que</a:t>
+            </a:r>
+            <a:r>
+              <a:rPr sz="1400" spc="10" dirty="0">
+                <a:latin typeface="Calibri"/>
+                <a:cs typeface="Calibri"/>
+              </a:rPr>
+              <a:t> </a:t>
+            </a:r>
+            <a:r>
+              <a:rPr sz="1400" dirty="0">
+                <a:latin typeface="Calibri"/>
+                <a:cs typeface="Calibri"/>
+              </a:rPr>
+              <a:t>el</a:t>
+            </a:r>
+            <a:r>
+              <a:rPr sz="1400" spc="5" dirty="0">
+                <a:latin typeface="Calibri"/>
+                <a:cs typeface="Calibri"/>
+              </a:rPr>
+              <a:t> </a:t>
+            </a:r>
+            <a:r>
+              <a:rPr sz="1400" spc="-5" dirty="0">
+                <a:latin typeface="Calibri"/>
+                <a:cs typeface="Calibri"/>
+              </a:rPr>
+              <a:t>aplicativo</a:t>
+            </a:r>
+            <a:r>
+              <a:rPr sz="1400" dirty="0">
+                <a:latin typeface="Calibri"/>
+                <a:cs typeface="Calibri"/>
+              </a:rPr>
+              <a:t> esta </a:t>
+            </a:r>
+            <a:r>
+              <a:rPr sz="1400" spc="-5" dirty="0">
+                <a:latin typeface="Calibri"/>
+                <a:cs typeface="Calibri"/>
+              </a:rPr>
+              <a:t>debidamente </a:t>
+            </a:r>
+            <a:r>
+              <a:rPr sz="1400" spc="-229" dirty="0">
+                <a:latin typeface="Calibri"/>
+                <a:cs typeface="Calibri"/>
+              </a:rPr>
+              <a:t> </a:t>
+            </a:r>
+            <a:r>
+              <a:rPr sz="1400" dirty="0">
+                <a:latin typeface="Calibri"/>
+                <a:cs typeface="Calibri"/>
+              </a:rPr>
+              <a:t>cargado.</a:t>
+            </a:r>
+          </a:p>
+        </p:txBody>
+      </p:sp>
+      <p:grpSp>
+        <p:nvGrpSpPr>
+          <p:cNvPr id="3" name="object 14">
+            <a:extLst>
+              <a:ext uri="{FF2B5EF4-FFF2-40B4-BE49-F238E27FC236}">
+                <a16:creationId xmlns:a16="http://schemas.microsoft.com/office/drawing/2014/main" id="{23535E86-FD37-27FE-9E8D-D75AAD184BCD}"/>
+              </a:ext>
+            </a:extLst>
+          </p:cNvPr>
+          <p:cNvGrpSpPr/>
+          <p:nvPr/>
+        </p:nvGrpSpPr>
+        <p:grpSpPr>
+          <a:xfrm>
+            <a:off x="5631221" y="6380806"/>
+            <a:ext cx="1282700" cy="343535"/>
+            <a:chOff x="3238500" y="9463405"/>
+            <a:chExt cx="1282700" cy="343535"/>
+          </a:xfrm>
+        </p:grpSpPr>
+        <p:sp>
+          <p:nvSpPr>
+            <p:cNvPr id="4" name="object 15">
+              <a:extLst>
+                <a:ext uri="{FF2B5EF4-FFF2-40B4-BE49-F238E27FC236}">
+                  <a16:creationId xmlns:a16="http://schemas.microsoft.com/office/drawing/2014/main" id="{4A461A01-CF35-D91A-548C-E0CEA22F7268}"/>
+                </a:ext>
+              </a:extLst>
+            </p:cNvPr>
+            <p:cNvSpPr/>
+            <p:nvPr/>
+          </p:nvSpPr>
+          <p:spPr>
+            <a:xfrm>
+              <a:off x="3238500" y="9463405"/>
+              <a:ext cx="1282700" cy="343535"/>
+            </a:xfrm>
+            <a:custGeom>
+              <a:avLst/>
+              <a:gdLst/>
+              <a:ahLst/>
+              <a:cxnLst/>
+              <a:rect l="l" t="t" r="r" b="b"/>
+              <a:pathLst>
+                <a:path w="1282700" h="343534">
+                  <a:moveTo>
+                    <a:pt x="1282700" y="0"/>
+                  </a:moveTo>
+                  <a:lnTo>
+                    <a:pt x="1234583" y="6200"/>
+                  </a:lnTo>
+                  <a:lnTo>
+                    <a:pt x="1186472" y="11917"/>
+                  </a:lnTo>
+                  <a:lnTo>
+                    <a:pt x="1138366" y="17151"/>
+                  </a:lnTo>
+                  <a:lnTo>
+                    <a:pt x="1090263" y="21901"/>
+                  </a:lnTo>
+                  <a:lnTo>
+                    <a:pt x="1042161" y="26168"/>
+                  </a:lnTo>
+                  <a:lnTo>
+                    <a:pt x="994060" y="29952"/>
+                  </a:lnTo>
+                  <a:lnTo>
+                    <a:pt x="945957" y="33252"/>
+                  </a:lnTo>
+                  <a:lnTo>
+                    <a:pt x="897851" y="36070"/>
+                  </a:lnTo>
+                  <a:lnTo>
+                    <a:pt x="849740" y="38406"/>
+                  </a:lnTo>
+                  <a:lnTo>
+                    <a:pt x="801624" y="40259"/>
+                  </a:lnTo>
+                  <a:lnTo>
+                    <a:pt x="962025" y="75145"/>
+                  </a:lnTo>
+                  <a:lnTo>
+                    <a:pt x="912698" y="78194"/>
+                  </a:lnTo>
+                  <a:lnTo>
+                    <a:pt x="863367" y="80735"/>
+                  </a:lnTo>
+                  <a:lnTo>
+                    <a:pt x="814033" y="82768"/>
+                  </a:lnTo>
+                  <a:lnTo>
+                    <a:pt x="764696" y="84292"/>
+                  </a:lnTo>
+                  <a:lnTo>
+                    <a:pt x="715358" y="85308"/>
+                  </a:lnTo>
+                  <a:lnTo>
+                    <a:pt x="666019" y="85817"/>
+                  </a:lnTo>
+                  <a:lnTo>
+                    <a:pt x="616680" y="85817"/>
+                  </a:lnTo>
+                  <a:lnTo>
+                    <a:pt x="567341" y="85308"/>
+                  </a:lnTo>
+                  <a:lnTo>
+                    <a:pt x="518003" y="84292"/>
+                  </a:lnTo>
+                  <a:lnTo>
+                    <a:pt x="468666" y="82768"/>
+                  </a:lnTo>
+                  <a:lnTo>
+                    <a:pt x="419332" y="80735"/>
+                  </a:lnTo>
+                  <a:lnTo>
+                    <a:pt x="370001" y="78194"/>
+                  </a:lnTo>
+                  <a:lnTo>
+                    <a:pt x="320675" y="75145"/>
+                  </a:lnTo>
+                  <a:lnTo>
+                    <a:pt x="480949" y="40259"/>
+                  </a:lnTo>
+                  <a:lnTo>
+                    <a:pt x="432863" y="38406"/>
+                  </a:lnTo>
+                  <a:lnTo>
+                    <a:pt x="384771" y="36070"/>
+                  </a:lnTo>
+                  <a:lnTo>
+                    <a:pt x="336674" y="33252"/>
+                  </a:lnTo>
+                  <a:lnTo>
+                    <a:pt x="288575" y="29952"/>
+                  </a:lnTo>
+                  <a:lnTo>
+                    <a:pt x="240474" y="26168"/>
+                  </a:lnTo>
+                  <a:lnTo>
+                    <a:pt x="192373" y="21901"/>
+                  </a:lnTo>
+                  <a:lnTo>
+                    <a:pt x="144274" y="17151"/>
+                  </a:lnTo>
+                  <a:lnTo>
+                    <a:pt x="96177" y="11917"/>
+                  </a:lnTo>
+                  <a:lnTo>
+                    <a:pt x="48085" y="6200"/>
+                  </a:lnTo>
+                  <a:lnTo>
+                    <a:pt x="0" y="0"/>
+                  </a:lnTo>
+                  <a:lnTo>
+                    <a:pt x="160274" y="147612"/>
+                  </a:lnTo>
+                  <a:lnTo>
+                    <a:pt x="0" y="257657"/>
+                  </a:lnTo>
+                  <a:lnTo>
+                    <a:pt x="53457" y="264515"/>
+                  </a:lnTo>
+                  <a:lnTo>
+                    <a:pt x="106901" y="270777"/>
+                  </a:lnTo>
+                  <a:lnTo>
+                    <a:pt x="160337" y="276442"/>
+                  </a:lnTo>
+                  <a:lnTo>
+                    <a:pt x="213773" y="281511"/>
+                  </a:lnTo>
+                  <a:lnTo>
+                    <a:pt x="267217" y="285985"/>
+                  </a:lnTo>
+                  <a:lnTo>
+                    <a:pt x="320675" y="289864"/>
+                  </a:lnTo>
+                  <a:lnTo>
+                    <a:pt x="320675" y="332803"/>
+                  </a:lnTo>
+                  <a:lnTo>
+                    <a:pt x="370001" y="335852"/>
+                  </a:lnTo>
+                  <a:lnTo>
+                    <a:pt x="419332" y="338393"/>
+                  </a:lnTo>
+                  <a:lnTo>
+                    <a:pt x="468666" y="340425"/>
+                  </a:lnTo>
+                  <a:lnTo>
+                    <a:pt x="518003" y="341950"/>
+                  </a:lnTo>
+                  <a:lnTo>
+                    <a:pt x="567341" y="342966"/>
+                  </a:lnTo>
+                  <a:lnTo>
+                    <a:pt x="616680" y="343474"/>
+                  </a:lnTo>
+                  <a:lnTo>
+                    <a:pt x="666019" y="343474"/>
+                  </a:lnTo>
+                  <a:lnTo>
+                    <a:pt x="715358" y="342966"/>
+                  </a:lnTo>
+                  <a:lnTo>
+                    <a:pt x="764696" y="341950"/>
+                  </a:lnTo>
+                  <a:lnTo>
+                    <a:pt x="814033" y="340425"/>
+                  </a:lnTo>
+                  <a:lnTo>
+                    <a:pt x="863367" y="338393"/>
+                  </a:lnTo>
+                  <a:lnTo>
+                    <a:pt x="912698" y="335852"/>
+                  </a:lnTo>
+                  <a:lnTo>
+                    <a:pt x="962025" y="332803"/>
+                  </a:lnTo>
+                  <a:lnTo>
+                    <a:pt x="962025" y="289864"/>
+                  </a:lnTo>
+                  <a:lnTo>
+                    <a:pt x="1015482" y="285985"/>
+                  </a:lnTo>
+                  <a:lnTo>
+                    <a:pt x="1068926" y="281511"/>
+                  </a:lnTo>
+                  <a:lnTo>
+                    <a:pt x="1122362" y="276442"/>
+                  </a:lnTo>
+                  <a:lnTo>
+                    <a:pt x="1175798" y="270777"/>
+                  </a:lnTo>
+                  <a:lnTo>
+                    <a:pt x="1229242" y="264515"/>
+                  </a:lnTo>
+                  <a:lnTo>
+                    <a:pt x="1282700" y="257657"/>
+                  </a:lnTo>
+                  <a:lnTo>
+                    <a:pt x="1122299" y="147612"/>
+                  </a:lnTo>
+                  <a:lnTo>
+                    <a:pt x="1282700" y="0"/>
+                  </a:lnTo>
+                  <a:close/>
+                </a:path>
+              </a:pathLst>
+            </a:custGeom>
+            <a:solidFill>
+              <a:srgbClr val="7E5F00"/>
+            </a:solidFill>
+          </p:spPr>
+          <p:txBody>
+            <a:bodyPr wrap="square" lIns="0" tIns="0" rIns="0" bIns="0" rtlCol="0"/>
+            <a:lstStyle/>
+            <a:p>
+              <a:endParaRPr dirty="0"/>
+            </a:p>
+          </p:txBody>
+        </p:sp>
+        <p:sp>
+          <p:nvSpPr>
+            <p:cNvPr id="5" name="object 16">
+              <a:extLst>
+                <a:ext uri="{FF2B5EF4-FFF2-40B4-BE49-F238E27FC236}">
+                  <a16:creationId xmlns:a16="http://schemas.microsoft.com/office/drawing/2014/main" id="{1893386F-DDDB-A0CF-6B54-B0A8D2FF825A}"/>
+                </a:ext>
+              </a:extLst>
+            </p:cNvPr>
+            <p:cNvSpPr/>
+            <p:nvPr/>
+          </p:nvSpPr>
+          <p:spPr>
+            <a:xfrm>
+              <a:off x="3559175" y="9503664"/>
+              <a:ext cx="641350" cy="45720"/>
+            </a:xfrm>
+            <a:custGeom>
+              <a:avLst/>
+              <a:gdLst/>
+              <a:ahLst/>
+              <a:cxnLst/>
+              <a:rect l="l" t="t" r="r" b="b"/>
+              <a:pathLst>
+                <a:path w="641350" h="45720">
+                  <a:moveTo>
+                    <a:pt x="332602" y="45558"/>
+                  </a:moveTo>
+                  <a:lnTo>
+                    <a:pt x="308713" y="45558"/>
+                  </a:lnTo>
+                  <a:lnTo>
+                    <a:pt x="320659" y="45624"/>
+                  </a:lnTo>
+                  <a:lnTo>
+                    <a:pt x="332602" y="45558"/>
+                  </a:lnTo>
+                  <a:close/>
+                </a:path>
+                <a:path w="641350" h="45720">
+                  <a:moveTo>
+                    <a:pt x="280960" y="45403"/>
+                  </a:moveTo>
+                  <a:lnTo>
+                    <a:pt x="296005" y="45558"/>
+                  </a:lnTo>
+                  <a:lnTo>
+                    <a:pt x="308713" y="45558"/>
+                  </a:lnTo>
+                  <a:lnTo>
+                    <a:pt x="280960" y="45403"/>
+                  </a:lnTo>
+                  <a:close/>
+                </a:path>
+                <a:path w="641350" h="45720">
+                  <a:moveTo>
+                    <a:pt x="360436" y="45402"/>
+                  </a:moveTo>
+                  <a:lnTo>
+                    <a:pt x="332602" y="45558"/>
+                  </a:lnTo>
+                  <a:lnTo>
+                    <a:pt x="345344" y="45558"/>
+                  </a:lnTo>
+                  <a:lnTo>
+                    <a:pt x="360436" y="45402"/>
+                  </a:lnTo>
+                  <a:close/>
+                </a:path>
+                <a:path w="641350" h="45720">
+                  <a:moveTo>
+                    <a:pt x="257141" y="45157"/>
+                  </a:moveTo>
+                  <a:lnTo>
+                    <a:pt x="267203" y="45326"/>
+                  </a:lnTo>
+                  <a:lnTo>
+                    <a:pt x="280960" y="45403"/>
+                  </a:lnTo>
+                  <a:lnTo>
+                    <a:pt x="257141" y="45157"/>
+                  </a:lnTo>
+                  <a:close/>
+                </a:path>
+                <a:path w="641350" h="45720">
+                  <a:moveTo>
+                    <a:pt x="384083" y="45159"/>
+                  </a:moveTo>
+                  <a:lnTo>
+                    <a:pt x="360436" y="45402"/>
+                  </a:lnTo>
+                  <a:lnTo>
+                    <a:pt x="374104" y="45326"/>
+                  </a:lnTo>
+                  <a:lnTo>
+                    <a:pt x="384083" y="45159"/>
+                  </a:lnTo>
+                  <a:close/>
+                </a:path>
+                <a:path w="641350" h="45720">
+                  <a:moveTo>
+                    <a:pt x="412503" y="44682"/>
+                  </a:moveTo>
+                  <a:lnTo>
+                    <a:pt x="384083" y="45159"/>
+                  </a:lnTo>
+                  <a:lnTo>
+                    <a:pt x="394683" y="45049"/>
+                  </a:lnTo>
+                  <a:lnTo>
+                    <a:pt x="412503" y="44682"/>
+                  </a:lnTo>
+                  <a:close/>
+                </a:path>
+                <a:path w="641350" h="45720">
+                  <a:moveTo>
+                    <a:pt x="229129" y="44688"/>
+                  </a:moveTo>
+                  <a:lnTo>
+                    <a:pt x="246666" y="45049"/>
+                  </a:lnTo>
+                  <a:lnTo>
+                    <a:pt x="257141" y="45157"/>
+                  </a:lnTo>
+                  <a:lnTo>
+                    <a:pt x="229129" y="44688"/>
+                  </a:lnTo>
+                  <a:close/>
+                </a:path>
+                <a:path w="641350" h="45720">
+                  <a:moveTo>
+                    <a:pt x="205633" y="44204"/>
+                  </a:moveTo>
+                  <a:lnTo>
+                    <a:pt x="213740" y="44430"/>
+                  </a:lnTo>
+                  <a:lnTo>
+                    <a:pt x="229129" y="44688"/>
+                  </a:lnTo>
+                  <a:lnTo>
+                    <a:pt x="205633" y="44204"/>
+                  </a:lnTo>
+                  <a:close/>
+                </a:path>
+                <a:path w="641350" h="45720">
+                  <a:moveTo>
+                    <a:pt x="435403" y="44211"/>
+                  </a:moveTo>
+                  <a:lnTo>
+                    <a:pt x="412503" y="44682"/>
+                  </a:lnTo>
+                  <a:lnTo>
+                    <a:pt x="427535" y="44430"/>
+                  </a:lnTo>
+                  <a:lnTo>
+                    <a:pt x="435403" y="44211"/>
+                  </a:lnTo>
+                  <a:close/>
+                </a:path>
+                <a:path w="641350" h="45720">
+                  <a:moveTo>
+                    <a:pt x="465379" y="43373"/>
+                  </a:moveTo>
+                  <a:lnTo>
+                    <a:pt x="435403" y="44211"/>
+                  </a:lnTo>
+                  <a:lnTo>
+                    <a:pt x="444021" y="44033"/>
+                  </a:lnTo>
+                  <a:lnTo>
+                    <a:pt x="465379" y="43373"/>
+                  </a:lnTo>
+                  <a:close/>
+                </a:path>
+                <a:path w="641350" h="45720">
+                  <a:moveTo>
+                    <a:pt x="177012" y="43405"/>
+                  </a:moveTo>
+                  <a:lnTo>
+                    <a:pt x="197328" y="44033"/>
+                  </a:lnTo>
+                  <a:lnTo>
+                    <a:pt x="205633" y="44204"/>
+                  </a:lnTo>
+                  <a:lnTo>
+                    <a:pt x="177012" y="43405"/>
+                  </a:lnTo>
+                  <a:close/>
+                </a:path>
+                <a:path w="641350" h="45720">
+                  <a:moveTo>
+                    <a:pt x="160274" y="42888"/>
+                  </a:moveTo>
+                  <a:lnTo>
+                    <a:pt x="177012" y="43405"/>
+                  </a:lnTo>
+                  <a:lnTo>
+                    <a:pt x="160274" y="42888"/>
+                  </a:lnTo>
+                  <a:close/>
+                </a:path>
+                <a:path w="641350" h="45720">
+                  <a:moveTo>
+                    <a:pt x="480949" y="42892"/>
+                  </a:moveTo>
+                  <a:lnTo>
+                    <a:pt x="465379" y="43373"/>
+                  </a:lnTo>
+                  <a:lnTo>
+                    <a:pt x="480949" y="42938"/>
+                  </a:lnTo>
+                  <a:close/>
+                </a:path>
+                <a:path w="641350" h="45720">
+                  <a:moveTo>
+                    <a:pt x="480949" y="0"/>
+                  </a:moveTo>
+                  <a:lnTo>
+                    <a:pt x="480949" y="42892"/>
+                  </a:lnTo>
+                  <a:lnTo>
+                    <a:pt x="493358" y="42509"/>
+                  </a:lnTo>
+                  <a:lnTo>
+                    <a:pt x="542692" y="40476"/>
+                  </a:lnTo>
+                  <a:lnTo>
+                    <a:pt x="592023" y="37935"/>
+                  </a:lnTo>
+                  <a:lnTo>
+                    <a:pt x="641350" y="34886"/>
+                  </a:lnTo>
+                  <a:lnTo>
+                    <a:pt x="480949" y="0"/>
+                  </a:lnTo>
+                  <a:close/>
+                </a:path>
+                <a:path w="641350" h="45720">
+                  <a:moveTo>
+                    <a:pt x="160274" y="0"/>
+                  </a:moveTo>
+                  <a:lnTo>
+                    <a:pt x="0" y="34886"/>
+                  </a:lnTo>
+                  <a:lnTo>
+                    <a:pt x="49326" y="37935"/>
+                  </a:lnTo>
+                  <a:lnTo>
+                    <a:pt x="98657" y="40476"/>
+                  </a:lnTo>
+                  <a:lnTo>
+                    <a:pt x="147991" y="42509"/>
+                  </a:lnTo>
+                  <a:lnTo>
+                    <a:pt x="160274" y="42888"/>
+                  </a:lnTo>
+                  <a:lnTo>
+                    <a:pt x="160274" y="0"/>
+                  </a:lnTo>
+                  <a:close/>
+                </a:path>
+              </a:pathLst>
+            </a:custGeom>
+            <a:solidFill>
+              <a:srgbClr val="664D00"/>
+            </a:solidFill>
+          </p:spPr>
+          <p:txBody>
+            <a:bodyPr wrap="square" lIns="0" tIns="0" rIns="0" bIns="0" rtlCol="0"/>
+            <a:lstStyle/>
+            <a:p>
+              <a:endParaRPr/>
+            </a:p>
+          </p:txBody>
+        </p:sp>
+        <p:sp>
+          <p:nvSpPr>
+            <p:cNvPr id="6" name="object 17">
+              <a:extLst>
+                <a:ext uri="{FF2B5EF4-FFF2-40B4-BE49-F238E27FC236}">
+                  <a16:creationId xmlns:a16="http://schemas.microsoft.com/office/drawing/2014/main" id="{A56E5C15-CAC0-A12C-AA1D-0ED4F11E8C80}"/>
+                </a:ext>
+              </a:extLst>
+            </p:cNvPr>
+            <p:cNvSpPr/>
+            <p:nvPr/>
+          </p:nvSpPr>
+          <p:spPr>
+            <a:xfrm>
+              <a:off x="3238500" y="9463405"/>
+              <a:ext cx="1282700" cy="343535"/>
+            </a:xfrm>
+            <a:custGeom>
+              <a:avLst/>
+              <a:gdLst/>
+              <a:ahLst/>
+              <a:cxnLst/>
+              <a:rect l="l" t="t" r="r" b="b"/>
+              <a:pathLst>
+                <a:path w="1282700" h="343534">
+                  <a:moveTo>
+                    <a:pt x="0" y="0"/>
+                  </a:moveTo>
+                  <a:lnTo>
+                    <a:pt x="48085" y="6200"/>
+                  </a:lnTo>
+                  <a:lnTo>
+                    <a:pt x="96177" y="11917"/>
+                  </a:lnTo>
+                  <a:lnTo>
+                    <a:pt x="144274" y="17151"/>
+                  </a:lnTo>
+                  <a:lnTo>
+                    <a:pt x="192373" y="21901"/>
+                  </a:lnTo>
+                  <a:lnTo>
+                    <a:pt x="240474" y="26168"/>
+                  </a:lnTo>
+                  <a:lnTo>
+                    <a:pt x="288575" y="29952"/>
+                  </a:lnTo>
+                  <a:lnTo>
+                    <a:pt x="336674" y="33252"/>
+                  </a:lnTo>
+                  <a:lnTo>
+                    <a:pt x="384771" y="36070"/>
+                  </a:lnTo>
+                  <a:lnTo>
+                    <a:pt x="432863" y="38406"/>
+                  </a:lnTo>
+                  <a:lnTo>
+                    <a:pt x="480949" y="40259"/>
+                  </a:lnTo>
+                  <a:lnTo>
+                    <a:pt x="320675" y="75145"/>
+                  </a:lnTo>
+                  <a:lnTo>
+                    <a:pt x="370001" y="78194"/>
+                  </a:lnTo>
+                  <a:lnTo>
+                    <a:pt x="419332" y="80735"/>
+                  </a:lnTo>
+                  <a:lnTo>
+                    <a:pt x="468666" y="82768"/>
+                  </a:lnTo>
+                  <a:lnTo>
+                    <a:pt x="518003" y="84292"/>
+                  </a:lnTo>
+                  <a:lnTo>
+                    <a:pt x="567341" y="85308"/>
+                  </a:lnTo>
+                  <a:lnTo>
+                    <a:pt x="616680" y="85817"/>
+                  </a:lnTo>
+                  <a:lnTo>
+                    <a:pt x="666019" y="85817"/>
+                  </a:lnTo>
+                  <a:lnTo>
+                    <a:pt x="715358" y="85308"/>
+                  </a:lnTo>
+                  <a:lnTo>
+                    <a:pt x="764696" y="84292"/>
+                  </a:lnTo>
+                  <a:lnTo>
+                    <a:pt x="814033" y="82768"/>
+                  </a:lnTo>
+                  <a:lnTo>
+                    <a:pt x="863367" y="80735"/>
+                  </a:lnTo>
+                  <a:lnTo>
+                    <a:pt x="912698" y="78194"/>
+                  </a:lnTo>
+                  <a:lnTo>
+                    <a:pt x="962025" y="75145"/>
+                  </a:lnTo>
+                  <a:lnTo>
+                    <a:pt x="801624" y="40259"/>
+                  </a:lnTo>
+                  <a:lnTo>
+                    <a:pt x="849740" y="38406"/>
+                  </a:lnTo>
+                  <a:lnTo>
+                    <a:pt x="897851" y="36070"/>
+                  </a:lnTo>
+                  <a:lnTo>
+                    <a:pt x="945957" y="33252"/>
+                  </a:lnTo>
+                  <a:lnTo>
+                    <a:pt x="994060" y="29952"/>
+                  </a:lnTo>
+                  <a:lnTo>
+                    <a:pt x="1042161" y="26168"/>
+                  </a:lnTo>
+                  <a:lnTo>
+                    <a:pt x="1090263" y="21901"/>
+                  </a:lnTo>
+                  <a:lnTo>
+                    <a:pt x="1138366" y="17151"/>
+                  </a:lnTo>
+                  <a:lnTo>
+                    <a:pt x="1186472" y="11917"/>
+                  </a:lnTo>
+                  <a:lnTo>
+                    <a:pt x="1234583" y="6200"/>
+                  </a:lnTo>
+                  <a:lnTo>
+                    <a:pt x="1282700" y="0"/>
+                  </a:lnTo>
+                  <a:lnTo>
+                    <a:pt x="1122299" y="147612"/>
+                  </a:lnTo>
+                  <a:lnTo>
+                    <a:pt x="1282700" y="257657"/>
+                  </a:lnTo>
+                  <a:lnTo>
+                    <a:pt x="1229242" y="264515"/>
+                  </a:lnTo>
+                  <a:lnTo>
+                    <a:pt x="1175798" y="270777"/>
+                  </a:lnTo>
+                  <a:lnTo>
+                    <a:pt x="1122362" y="276442"/>
+                  </a:lnTo>
+                  <a:lnTo>
+                    <a:pt x="1068926" y="281511"/>
+                  </a:lnTo>
+                  <a:lnTo>
+                    <a:pt x="1015482" y="285985"/>
+                  </a:lnTo>
+                  <a:lnTo>
+                    <a:pt x="962025" y="289864"/>
+                  </a:lnTo>
+                  <a:lnTo>
+                    <a:pt x="962025" y="332803"/>
+                  </a:lnTo>
+                  <a:lnTo>
+                    <a:pt x="912698" y="335852"/>
+                  </a:lnTo>
+                  <a:lnTo>
+                    <a:pt x="863367" y="338393"/>
+                  </a:lnTo>
+                  <a:lnTo>
+                    <a:pt x="814033" y="340425"/>
+                  </a:lnTo>
+                  <a:lnTo>
+                    <a:pt x="764696" y="341950"/>
+                  </a:lnTo>
+                  <a:lnTo>
+                    <a:pt x="715358" y="342966"/>
+                  </a:lnTo>
+                  <a:lnTo>
+                    <a:pt x="666019" y="343474"/>
+                  </a:lnTo>
+                  <a:lnTo>
+                    <a:pt x="616680" y="343474"/>
+                  </a:lnTo>
+                  <a:lnTo>
+                    <a:pt x="567341" y="342966"/>
+                  </a:lnTo>
+                  <a:lnTo>
+                    <a:pt x="518003" y="341950"/>
+                  </a:lnTo>
+                  <a:lnTo>
+                    <a:pt x="468666" y="340425"/>
+                  </a:lnTo>
+                  <a:lnTo>
+                    <a:pt x="419332" y="338393"/>
+                  </a:lnTo>
+                  <a:lnTo>
+                    <a:pt x="370001" y="335852"/>
+                  </a:lnTo>
+                  <a:lnTo>
+                    <a:pt x="320675" y="332803"/>
+                  </a:lnTo>
+                  <a:lnTo>
+                    <a:pt x="320675" y="289864"/>
+                  </a:lnTo>
+                  <a:lnTo>
+                    <a:pt x="267217" y="285985"/>
+                  </a:lnTo>
+                  <a:lnTo>
+                    <a:pt x="213773" y="281511"/>
+                  </a:lnTo>
+                  <a:lnTo>
+                    <a:pt x="160337" y="276442"/>
+                  </a:lnTo>
+                  <a:lnTo>
+                    <a:pt x="106901" y="270777"/>
+                  </a:lnTo>
+                  <a:lnTo>
+                    <a:pt x="53457" y="264515"/>
+                  </a:lnTo>
+                  <a:lnTo>
+                    <a:pt x="0" y="257657"/>
+                  </a:lnTo>
+                  <a:lnTo>
+                    <a:pt x="160274" y="147612"/>
+                  </a:lnTo>
+                  <a:lnTo>
+                    <a:pt x="0" y="0"/>
+                  </a:lnTo>
+                  <a:close/>
+                </a:path>
+                <a:path w="1282700" h="343534">
+                  <a:moveTo>
+                    <a:pt x="320675" y="289864"/>
+                  </a:moveTo>
+                  <a:lnTo>
+                    <a:pt x="320675" y="75145"/>
+                  </a:lnTo>
+                </a:path>
+                <a:path w="1282700" h="343534">
+                  <a:moveTo>
+                    <a:pt x="962025" y="75145"/>
+                  </a:moveTo>
+                  <a:lnTo>
+                    <a:pt x="962025" y="289864"/>
+                  </a:lnTo>
+                </a:path>
+                <a:path w="1282700" h="343534">
+                  <a:moveTo>
+                    <a:pt x="480949" y="40259"/>
+                  </a:moveTo>
+                  <a:lnTo>
+                    <a:pt x="480949" y="83197"/>
+                  </a:lnTo>
+                </a:path>
+                <a:path w="1282700" h="343534">
+                  <a:moveTo>
+                    <a:pt x="801624" y="83197"/>
+                  </a:moveTo>
+                  <a:lnTo>
+                    <a:pt x="801624" y="40259"/>
+                  </a:lnTo>
+                </a:path>
+              </a:pathLst>
+            </a:custGeom>
+            <a:ln w="9525">
+              <a:solidFill>
+                <a:srgbClr val="FFC000"/>
+              </a:solidFill>
+            </a:ln>
+          </p:spPr>
+          <p:txBody>
+            <a:bodyPr wrap="square" lIns="0" tIns="0" rIns="0" bIns="0" rtlCol="0"/>
+            <a:lstStyle/>
+            <a:p>
+              <a:endParaRPr dirty="0"/>
+            </a:p>
+          </p:txBody>
+        </p:sp>
+      </p:grpSp>
+      <p:sp>
+        <p:nvSpPr>
+          <p:cNvPr id="7" name="CuadroTexto 6">
+            <a:extLst>
+              <a:ext uri="{FF2B5EF4-FFF2-40B4-BE49-F238E27FC236}">
+                <a16:creationId xmlns:a16="http://schemas.microsoft.com/office/drawing/2014/main" id="{712312DD-FF0D-9CB1-3AEE-126BB1AFE147}"/>
+              </a:ext>
+            </a:extLst>
+          </p:cNvPr>
+          <p:cNvSpPr txBox="1"/>
+          <p:nvPr/>
+        </p:nvSpPr>
+        <p:spPr>
+          <a:xfrm>
+            <a:off x="6093541" y="6421065"/>
+            <a:ext cx="575187" cy="400110"/>
+          </a:xfrm>
+          <a:prstGeom prst="rect">
+            <a:avLst/>
+          </a:prstGeom>
+          <a:noFill/>
+        </p:spPr>
+        <p:txBody>
+          <a:bodyPr wrap="square" rtlCol="0">
+            <a:spAutoFit/>
+          </a:bodyPr>
+          <a:lstStyle/>
+          <a:p>
+            <a:r>
+              <a:rPr lang="es-MX" sz="2000" dirty="0">
+                <a:solidFill>
+                  <a:schemeClr val="bg1"/>
+                </a:solidFill>
+              </a:rPr>
+              <a:t>10</a:t>
+            </a:r>
+          </a:p>
+        </p:txBody>
+      </p:sp>
+      <p:pic>
+        <p:nvPicPr>
+          <p:cNvPr id="9" name="Imagen 8" descr="Interfaz de usuario gráfica&#10;&#10;Descripción generada automáticamente con confianza baja">
+            <a:extLst>
+              <a:ext uri="{FF2B5EF4-FFF2-40B4-BE49-F238E27FC236}">
+                <a16:creationId xmlns:a16="http://schemas.microsoft.com/office/drawing/2014/main" id="{444C749F-8FB4-9604-D555-978AA2D28A58}"/>
+              </a:ext>
+            </a:extLst>
+          </p:cNvPr>
+          <p:cNvPicPr>
+            <a:picLocks noChangeAspect="1"/>
+          </p:cNvPicPr>
+          <p:nvPr/>
+        </p:nvPicPr>
+        <p:blipFill>
+          <a:blip r:embed="rId2">
+            <a:extLst>
+              <a:ext uri="{28A0092B-C50C-407E-A947-70E740481C1C}">
+                <a14:useLocalDpi xmlns:a14="http://schemas.microsoft.com/office/drawing/2010/main" val="0"/>
+              </a:ext>
+            </a:extLst>
+          </a:blip>
+          <a:stretch>
+            <a:fillRect/>
+          </a:stretch>
+        </p:blipFill>
+        <p:spPr>
+          <a:xfrm>
+            <a:off x="2135123" y="2123755"/>
+            <a:ext cx="8274896" cy="3877903"/>
+          </a:xfrm>
+          <a:prstGeom prst="rect">
+            <a:avLst/>
+          </a:prstGeom>
+          <a:ln>
+            <a:noFill/>
+          </a:ln>
+          <a:effectLst>
+            <a:outerShdw blurRad="292100" dist="139700" dir="2700000" algn="tl" rotWithShape="0">
+              <a:srgbClr val="333333">
+                <a:alpha val="65000"/>
+              </a:srgbClr>
+            </a:outerShdw>
+          </a:effectLst>
+        </p:spPr>
+      </p:pic>
+      <p:sp>
+        <p:nvSpPr>
+          <p:cNvPr id="10" name="Rectángulo 9">
+            <a:extLst>
+              <a:ext uri="{FF2B5EF4-FFF2-40B4-BE49-F238E27FC236}">
+                <a16:creationId xmlns:a16="http://schemas.microsoft.com/office/drawing/2014/main" id="{839D8AA4-B157-B063-ADB2-26D61C34680D}"/>
+              </a:ext>
+            </a:extLst>
+          </p:cNvPr>
+          <p:cNvSpPr/>
+          <p:nvPr/>
+        </p:nvSpPr>
+        <p:spPr>
+          <a:xfrm>
+            <a:off x="1" y="0"/>
+            <a:ext cx="12192000" cy="438277"/>
+          </a:xfrm>
+          <a:prstGeom prst="rect">
+            <a:avLst/>
+          </a:prstGeom>
+          <a:solidFill>
+            <a:schemeClr val="accent6">
+              <a:lumMod val="75000"/>
+            </a:schemeClr>
+          </a:solidFill>
+        </p:spPr>
+        <p:style>
+          <a:lnRef idx="2">
+            <a:schemeClr val="accent1">
+              <a:shade val="15000"/>
+            </a:schemeClr>
+          </a:lnRef>
+          <a:fillRef idx="1">
+            <a:schemeClr val="accent1"/>
+          </a:fillRef>
+          <a:effectRef idx="0">
+            <a:schemeClr val="accent1"/>
+          </a:effectRef>
+          <a:fontRef idx="minor">
+            <a:schemeClr val="lt1"/>
+          </a:fontRef>
+        </p:style>
+        <p:txBody>
+          <a:bodyPr rtlCol="0" anchor="ctr"/>
+          <a:lstStyle/>
+          <a:p>
+            <a:pPr algn="r"/>
+            <a:r>
+              <a:rPr lang="es-MX" dirty="0">
+                <a:solidFill>
+                  <a:srgbClr val="FFFF00"/>
+                </a:solidFill>
+                <a:latin typeface="Berlin Sans FB Demi" panose="020E0802020502020306" pitchFamily="34" charset="0"/>
+              </a:rPr>
+              <a:t>MANUAL TECNICO</a:t>
+            </a:r>
+          </a:p>
+        </p:txBody>
+      </p:sp>
+    </p:spTree>
+    <p:extLst>
+      <p:ext uri="{BB962C8B-B14F-4D97-AF65-F5344CB8AC3E}">
+        <p14:creationId xmlns:p14="http://schemas.microsoft.com/office/powerpoint/2010/main" val="2117078503"/>
+      </p:ext>
+    </p:extLst>
+  </p:cSld>
+  <p:clrMapOvr>
+    <a:masterClrMapping/>
+  </p:clrMapOvr>
+</p:sld>
+</file>
+
 <file path=ppt/slides/slide2.xml><?xml version="1.0" encoding="utf-8"?>
 <p:sld xmlns:a="http://schemas.openxmlformats.org/drawingml/2006/main" xmlns:r="http://schemas.openxmlformats.org/officeDocument/2006/relationships" xmlns:p="http://schemas.openxmlformats.org/presentationml/2006/main">
   <p:cSld>
@@ -15977,7 +17308,7 @@
           <p:cNvPr id="2" name="object 2">
             <a:extLst>
               <a:ext uri="{FF2B5EF4-FFF2-40B4-BE49-F238E27FC236}">
-                <a16:creationId xmlns:a16="http://schemas.microsoft.com/office/drawing/2014/main" id="{A97EDF9E-5660-7809-B50A-8970BA799752}"/>
+                <a16:creationId xmlns:a16="http://schemas.microsoft.com/office/drawing/2014/main" id="{7719575F-1E5D-CD35-6E29-BC8177F3DCAC}"/>
               </a:ext>
             </a:extLst>
           </p:cNvPr>
@@ -15986,8 +17317,8 @@
         </p:nvSpPr>
         <p:spPr>
           <a:xfrm>
-            <a:off x="1726221" y="739672"/>
-            <a:ext cx="10057740" cy="1137684"/>
+            <a:off x="1598195" y="2401573"/>
+            <a:ext cx="5424289" cy="671979"/>
           </a:xfrm>
           <a:prstGeom prst="rect">
             <a:avLst/>
@@ -16008,316 +17339,42 @@
               </a:spcBef>
             </a:pPr>
             <a:r>
-              <a:rPr sz="1400" b="1" dirty="0">
-                <a:latin typeface="Calibri"/>
-                <a:cs typeface="Calibri"/>
-              </a:rPr>
-              <a:t>EJECUCIÓN</a:t>
-            </a:r>
-            <a:r>
-              <a:rPr sz="1400" b="1" spc="-30" dirty="0">
-                <a:latin typeface="Calibri"/>
-                <a:cs typeface="Calibri"/>
-              </a:rPr>
-              <a:t> </a:t>
-            </a:r>
-            <a:r>
-              <a:rPr sz="1400" b="1" spc="-5" dirty="0">
-                <a:latin typeface="Calibri"/>
-                <a:cs typeface="Calibri"/>
-              </a:rPr>
-              <a:t>DEL</a:t>
-            </a:r>
-            <a:r>
-              <a:rPr sz="1400" b="1" spc="-25" dirty="0">
-                <a:latin typeface="Calibri"/>
-                <a:cs typeface="Calibri"/>
-              </a:rPr>
-              <a:t> </a:t>
-            </a:r>
-            <a:r>
-              <a:rPr sz="1400" b="1" spc="-5" dirty="0">
-                <a:latin typeface="Calibri"/>
-                <a:cs typeface="Calibri"/>
-              </a:rPr>
-              <a:t>APLICATIVO</a:t>
-            </a:r>
-            <a:endParaRPr sz="1400" dirty="0">
-              <a:latin typeface="Calibri"/>
-              <a:cs typeface="Calibri"/>
-            </a:endParaRPr>
+              <a:rPr lang="es-MX" sz="1400" b="1" spc="-5" dirty="0">
+                <a:latin typeface="Calibri"/>
+                <a:cs typeface="Calibri"/>
+              </a:rPr>
+              <a:t>CASOS DE USO.</a:t>
+            </a:r>
           </a:p>
           <a:p>
-            <a:pPr>
+            <a:pPr marL="12700">
               <a:lnSpc>
                 <a:spcPct val="100000"/>
               </a:lnSpc>
               <a:spcBef>
-                <a:spcPts val="45"/>
+                <a:spcPts val="100"/>
               </a:spcBef>
             </a:pPr>
-            <a:endParaRPr sz="1400" dirty="0">
+            <a:r>
+              <a:rPr lang="es-MX" sz="1400" b="0" i="0" dirty="0">
+                <a:effectLst/>
+                <a:latin typeface="Google Sans"/>
+              </a:rPr>
+              <a:t>Representa la lista de tareas que los actores pueden realizar y está directamente relacionado con los requisitos del proceso de negocio.</a:t>
+            </a:r>
+            <a:endParaRPr lang="es-MX" sz="1400" b="1" spc="-5" dirty="0">
               <a:latin typeface="Calibri"/>
               <a:cs typeface="Calibri"/>
             </a:endParaRPr>
-          </a:p>
-          <a:p>
-            <a:pPr marL="12700" marR="1890395">
-              <a:lnSpc>
-                <a:spcPct val="170000"/>
-              </a:lnSpc>
-              <a:spcBef>
-                <a:spcPts val="5"/>
-              </a:spcBef>
-            </a:pPr>
-            <a:r>
-              <a:rPr sz="1400" dirty="0">
-                <a:latin typeface="Calibri"/>
-                <a:cs typeface="Calibri"/>
-              </a:rPr>
-              <a:t>para la ejecución </a:t>
-            </a:r>
-            <a:r>
-              <a:rPr sz="1400" spc="-5" dirty="0">
-                <a:latin typeface="Calibri"/>
-                <a:cs typeface="Calibri"/>
-              </a:rPr>
-              <a:t>del aplicativo debemos </a:t>
-            </a:r>
-            <a:r>
-              <a:rPr sz="1400" dirty="0">
-                <a:latin typeface="Calibri"/>
-                <a:cs typeface="Calibri"/>
-              </a:rPr>
-              <a:t>ingresar a la </a:t>
-            </a:r>
-            <a:r>
-              <a:rPr sz="1400" dirty="0" err="1">
-                <a:latin typeface="Calibri"/>
-                <a:cs typeface="Calibri"/>
-              </a:rPr>
-              <a:t>ruta</a:t>
-            </a:r>
-            <a:r>
-              <a:rPr sz="1400" dirty="0">
-                <a:latin typeface="Calibri"/>
-                <a:cs typeface="Calibri"/>
-              </a:rPr>
-              <a:t> </a:t>
-            </a:r>
-            <a:r>
-              <a:rPr sz="1400" spc="-235" dirty="0">
-                <a:latin typeface="Calibri"/>
-                <a:cs typeface="Calibri"/>
-              </a:rPr>
-              <a:t> </a:t>
-            </a:r>
-            <a:r>
-              <a:rPr lang="es-MX" sz="1400" u="sng" spc="-5" dirty="0">
-                <a:solidFill>
-                  <a:srgbClr val="0462C1"/>
-                </a:solidFill>
-                <a:uFill>
-                  <a:solidFill>
-                    <a:srgbClr val="0462C1"/>
-                  </a:solidFill>
-                </a:uFill>
-                <a:latin typeface="Calibri"/>
-                <a:cs typeface="Calibri"/>
-              </a:rPr>
-              <a:t>127.0.0.1..8000</a:t>
-            </a:r>
-            <a:endParaRPr sz="1400" dirty="0">
-              <a:latin typeface="Calibri"/>
-              <a:cs typeface="Calibri"/>
-            </a:endParaRPr>
-          </a:p>
-          <a:p>
-            <a:pPr marL="12700" marR="5080">
-              <a:lnSpc>
-                <a:spcPct val="110000"/>
-              </a:lnSpc>
-              <a:spcBef>
-                <a:spcPts val="795"/>
-              </a:spcBef>
-            </a:pPr>
-            <a:r>
-              <a:rPr sz="1400" dirty="0">
-                <a:latin typeface="Calibri"/>
-                <a:cs typeface="Calibri"/>
-              </a:rPr>
-              <a:t>Al</a:t>
-            </a:r>
-            <a:r>
-              <a:rPr sz="1400" spc="-5" dirty="0">
-                <a:latin typeface="Calibri"/>
-                <a:cs typeface="Calibri"/>
-              </a:rPr>
-              <a:t> </a:t>
-            </a:r>
-            <a:r>
-              <a:rPr sz="1400" dirty="0">
-                <a:latin typeface="Calibri"/>
-                <a:cs typeface="Calibri"/>
-              </a:rPr>
-              <a:t>ingresar</a:t>
-            </a:r>
-            <a:r>
-              <a:rPr sz="1400" spc="5" dirty="0">
-                <a:latin typeface="Calibri"/>
-                <a:cs typeface="Calibri"/>
-              </a:rPr>
-              <a:t> </a:t>
-            </a:r>
-            <a:r>
-              <a:rPr sz="1400" dirty="0">
-                <a:latin typeface="Calibri"/>
-                <a:cs typeface="Calibri"/>
-              </a:rPr>
-              <a:t>al</a:t>
-            </a:r>
-            <a:r>
-              <a:rPr sz="1400" spc="5" dirty="0">
-                <a:latin typeface="Calibri"/>
-                <a:cs typeface="Calibri"/>
-              </a:rPr>
-              <a:t> </a:t>
-            </a:r>
-            <a:r>
-              <a:rPr sz="1400" spc="-5" dirty="0">
-                <a:latin typeface="Calibri"/>
-                <a:cs typeface="Calibri"/>
-              </a:rPr>
-              <a:t>navegador</a:t>
-            </a:r>
-            <a:r>
-              <a:rPr sz="1400" spc="5" dirty="0">
-                <a:latin typeface="Calibri"/>
-                <a:cs typeface="Calibri"/>
-              </a:rPr>
-              <a:t> </a:t>
-            </a:r>
-            <a:r>
-              <a:rPr sz="1400" spc="-5" dirty="0">
-                <a:latin typeface="Calibri"/>
-                <a:cs typeface="Calibri"/>
-              </a:rPr>
-              <a:t>esta</a:t>
-            </a:r>
-            <a:r>
-              <a:rPr sz="1400" dirty="0">
-                <a:latin typeface="Calibri"/>
-                <a:cs typeface="Calibri"/>
-              </a:rPr>
-              <a:t> ruta,</a:t>
-            </a:r>
-            <a:r>
-              <a:rPr sz="1400" spc="-5" dirty="0">
-                <a:latin typeface="Calibri"/>
-                <a:cs typeface="Calibri"/>
-              </a:rPr>
-              <a:t> </a:t>
-            </a:r>
-            <a:r>
-              <a:rPr sz="1400" dirty="0">
-                <a:latin typeface="Calibri"/>
-                <a:cs typeface="Calibri"/>
-              </a:rPr>
-              <a:t>es</a:t>
-            </a:r>
-            <a:r>
-              <a:rPr sz="1400" spc="10" dirty="0">
-                <a:latin typeface="Calibri"/>
-                <a:cs typeface="Calibri"/>
-              </a:rPr>
-              <a:t> </a:t>
-            </a:r>
-            <a:r>
-              <a:rPr sz="1400" spc="-5" dirty="0">
-                <a:latin typeface="Calibri"/>
-                <a:cs typeface="Calibri"/>
-              </a:rPr>
-              <a:t>posible </a:t>
-            </a:r>
-            <a:r>
-              <a:rPr sz="1400" dirty="0">
-                <a:latin typeface="Calibri"/>
-                <a:cs typeface="Calibri"/>
-              </a:rPr>
-              <a:t>evidenciar </a:t>
-            </a:r>
-            <a:r>
-              <a:rPr sz="1400" spc="-5" dirty="0">
-                <a:latin typeface="Calibri"/>
-                <a:cs typeface="Calibri"/>
-              </a:rPr>
-              <a:t>que</a:t>
-            </a:r>
-            <a:r>
-              <a:rPr sz="1400" spc="10" dirty="0">
-                <a:latin typeface="Calibri"/>
-                <a:cs typeface="Calibri"/>
-              </a:rPr>
-              <a:t> </a:t>
-            </a:r>
-            <a:r>
-              <a:rPr sz="1400" dirty="0">
-                <a:latin typeface="Calibri"/>
-                <a:cs typeface="Calibri"/>
-              </a:rPr>
-              <a:t>el</a:t>
-            </a:r>
-            <a:r>
-              <a:rPr sz="1400" spc="5" dirty="0">
-                <a:latin typeface="Calibri"/>
-                <a:cs typeface="Calibri"/>
-              </a:rPr>
-              <a:t> </a:t>
-            </a:r>
-            <a:r>
-              <a:rPr sz="1400" spc="-5" dirty="0">
-                <a:latin typeface="Calibri"/>
-                <a:cs typeface="Calibri"/>
-              </a:rPr>
-              <a:t>aplicativo</a:t>
-            </a:r>
-            <a:r>
-              <a:rPr sz="1400" dirty="0">
-                <a:latin typeface="Calibri"/>
-                <a:cs typeface="Calibri"/>
-              </a:rPr>
-              <a:t> esta </a:t>
-            </a:r>
-            <a:r>
-              <a:rPr sz="1400" spc="-5" dirty="0">
-                <a:latin typeface="Calibri"/>
-                <a:cs typeface="Calibri"/>
-              </a:rPr>
-              <a:t>debidamente </a:t>
-            </a:r>
-            <a:r>
-              <a:rPr sz="1400" spc="-229" dirty="0">
-                <a:latin typeface="Calibri"/>
-                <a:cs typeface="Calibri"/>
-              </a:rPr>
-              <a:t> </a:t>
-            </a:r>
-            <a:r>
-              <a:rPr sz="1400" dirty="0">
-                <a:latin typeface="Calibri"/>
-                <a:cs typeface="Calibri"/>
-              </a:rPr>
-              <a:t>cargado.</a:t>
-            </a:r>
           </a:p>
         </p:txBody>
       </p:sp>
       <p:grpSp>
         <p:nvGrpSpPr>
-          <p:cNvPr id="3" name="object 14">
+          <p:cNvPr id="5" name="object 14">
             <a:extLst>
               <a:ext uri="{FF2B5EF4-FFF2-40B4-BE49-F238E27FC236}">
-                <a16:creationId xmlns:a16="http://schemas.microsoft.com/office/drawing/2014/main" id="{23535E86-FD37-27FE-9E8D-D75AAD184BCD}"/>
+                <a16:creationId xmlns:a16="http://schemas.microsoft.com/office/drawing/2014/main" id="{A7BFBF45-7AFC-F135-86F9-ED6137D7D9F9}"/>
               </a:ext>
             </a:extLst>
           </p:cNvPr>
@@ -16334,10 +17391,10 @@
         </p:grpSpPr>
         <p:sp>
           <p:nvSpPr>
-            <p:cNvPr id="4" name="object 15">
+            <p:cNvPr id="6" name="object 15">
               <a:extLst>
                 <a:ext uri="{FF2B5EF4-FFF2-40B4-BE49-F238E27FC236}">
-                  <a16:creationId xmlns:a16="http://schemas.microsoft.com/office/drawing/2014/main" id="{4A461A01-CF35-D91A-548C-E0CEA22F7268}"/>
+                  <a16:creationId xmlns:a16="http://schemas.microsoft.com/office/drawing/2014/main" id="{F8A7A377-DF0A-573F-D8A2-DF0A84CBAF0F}"/>
                 </a:ext>
               </a:extLst>
             </p:cNvPr>
@@ -16576,10 +17633,10 @@
         </p:sp>
         <p:sp>
           <p:nvSpPr>
-            <p:cNvPr id="5" name="object 16">
+            <p:cNvPr id="7" name="object 16">
               <a:extLst>
                 <a:ext uri="{FF2B5EF4-FFF2-40B4-BE49-F238E27FC236}">
-                  <a16:creationId xmlns:a16="http://schemas.microsoft.com/office/drawing/2014/main" id="{1893386F-DDDB-A0CF-6B54-B0A8D2FF825A}"/>
+                  <a16:creationId xmlns:a16="http://schemas.microsoft.com/office/drawing/2014/main" id="{933B0B86-D726-ED3D-8A20-E346C3DDD8BE}"/>
                 </a:ext>
               </a:extLst>
             </p:cNvPr>
@@ -16851,10 +17908,10 @@
         </p:sp>
         <p:sp>
           <p:nvSpPr>
-            <p:cNvPr id="6" name="object 17">
+            <p:cNvPr id="8" name="object 17">
               <a:extLst>
                 <a:ext uri="{FF2B5EF4-FFF2-40B4-BE49-F238E27FC236}">
-                  <a16:creationId xmlns:a16="http://schemas.microsoft.com/office/drawing/2014/main" id="{A56E5C15-CAC0-A12C-AA1D-0ED4F11E8C80}"/>
+                  <a16:creationId xmlns:a16="http://schemas.microsoft.com/office/drawing/2014/main" id="{0CFDE5B8-00FC-543E-465C-4C4202EE52AF}"/>
                 </a:ext>
               </a:extLst>
             </p:cNvPr>
@@ -17128,10 +18185,10 @@
       </p:grpSp>
       <p:sp>
         <p:nvSpPr>
-          <p:cNvPr id="7" name="CuadroTexto 6">
+          <p:cNvPr id="9" name="CuadroTexto 8">
             <a:extLst>
               <a:ext uri="{FF2B5EF4-FFF2-40B4-BE49-F238E27FC236}">
-                <a16:creationId xmlns:a16="http://schemas.microsoft.com/office/drawing/2014/main" id="{712312DD-FF0D-9CB1-3AEE-126BB1AFE147}"/>
+                <a16:creationId xmlns:a16="http://schemas.microsoft.com/office/drawing/2014/main" id="{C3AAE22D-A715-25C9-3268-88385C1E6EC2}"/>
               </a:ext>
             </a:extLst>
           </p:cNvPr>
@@ -17165,58 +18222,12 @@
           </a:p>
         </p:txBody>
       </p:sp>
-      <p:pic>
-        <p:nvPicPr>
-          <p:cNvPr id="9" name="Imagen 8" descr="Interfaz de usuario gráfica&#10;&#10;Descripción generada automáticamente con confianza baja">
-            <a:extLst>
-              <a:ext uri="{FF2B5EF4-FFF2-40B4-BE49-F238E27FC236}">
-                <a16:creationId xmlns:a16="http://schemas.microsoft.com/office/drawing/2014/main" id="{444C749F-8FB4-9604-D555-978AA2D28A58}"/>
-              </a:ext>
-            </a:extLst>
-          </p:cNvPr>
-          <p:cNvPicPr>
-            <a:picLocks noChangeAspect="1"/>
-          </p:cNvPicPr>
-          <p:nvPr/>
-        </p:nvPicPr>
-        <p:blipFill>
-          <a:blip r:embed="rId2">
-            <a:extLst>
-              <a:ext uri="{28A0092B-C50C-407E-A947-70E740481C1C}">
-                <a14:useLocalDpi xmlns:a14="http://schemas.microsoft.com/office/drawing/2010/main" val="0"/>
-              </a:ext>
-            </a:extLst>
-          </a:blip>
-          <a:stretch>
-            <a:fillRect/>
-          </a:stretch>
-        </p:blipFill>
-        <p:spPr>
-          <a:xfrm>
-            <a:off x="2135123" y="2123755"/>
-            <a:ext cx="8274896" cy="3877903"/>
-          </a:xfrm>
-          <a:prstGeom prst="rect">
-            <a:avLst/>
-          </a:prstGeom>
-          <a:ln>
-            <a:noFill/>
-          </a:ln>
-          <a:effectLst>
-            <a:outerShdw blurRad="292100" dist="139700" dir="2700000" algn="tl" rotWithShape="0">
-              <a:srgbClr val="333333">
-                <a:alpha val="65000"/>
-              </a:srgbClr>
-            </a:outerShdw>
-          </a:effectLst>
-        </p:spPr>
-      </p:pic>
       <p:sp>
         <p:nvSpPr>
           <p:cNvPr id="10" name="Rectángulo 9">
             <a:extLst>
               <a:ext uri="{FF2B5EF4-FFF2-40B4-BE49-F238E27FC236}">
-                <a16:creationId xmlns:a16="http://schemas.microsoft.com/office/drawing/2014/main" id="{839D8AA4-B157-B063-ADB2-26D61C34680D}"/>
+                <a16:creationId xmlns:a16="http://schemas.microsoft.com/office/drawing/2014/main" id="{F0A3EE6C-DFA2-0245-9DAC-A91B11E90405}"/>
               </a:ext>
             </a:extLst>
           </p:cNvPr>
@@ -17270,10 +18281,2238 @@
           </a:p>
         </p:txBody>
       </p:sp>
+      <p:pic>
+        <p:nvPicPr>
+          <p:cNvPr id="11" name="Imagen 10" descr="Diagrama&#10;&#10;Descripción generada automáticamente">
+            <a:extLst>
+              <a:ext uri="{FF2B5EF4-FFF2-40B4-BE49-F238E27FC236}">
+                <a16:creationId xmlns:a16="http://schemas.microsoft.com/office/drawing/2014/main" id="{09B6464D-B4CD-B216-DB32-BE0B67FF6060}"/>
+              </a:ext>
+            </a:extLst>
+          </p:cNvPr>
+          <p:cNvPicPr>
+            <a:picLocks noChangeAspect="1"/>
+          </p:cNvPicPr>
+          <p:nvPr/>
+        </p:nvPicPr>
+        <p:blipFill>
+          <a:blip r:embed="rId2">
+            <a:extLst>
+              <a:ext uri="{28A0092B-C50C-407E-A947-70E740481C1C}">
+                <a14:useLocalDpi xmlns:a14="http://schemas.microsoft.com/office/drawing/2010/main" val="0"/>
+              </a:ext>
+            </a:extLst>
+          </a:blip>
+          <a:stretch>
+            <a:fillRect/>
+          </a:stretch>
+        </p:blipFill>
+        <p:spPr>
+          <a:xfrm>
+            <a:off x="7131048" y="637289"/>
+            <a:ext cx="4037800" cy="5958348"/>
+          </a:xfrm>
+          <a:prstGeom prst="rect">
+            <a:avLst/>
+          </a:prstGeom>
+          <a:ln>
+            <a:noFill/>
+          </a:ln>
+          <a:effectLst>
+            <a:outerShdw blurRad="292100" dist="139700" dir="2700000" algn="tl" rotWithShape="0">
+              <a:srgbClr val="333333">
+                <a:alpha val="65000"/>
+              </a:srgbClr>
+            </a:outerShdw>
+          </a:effectLst>
+        </p:spPr>
+      </p:pic>
     </p:spTree>
     <p:extLst>
       <p:ext uri="{BB962C8B-B14F-4D97-AF65-F5344CB8AC3E}">
-        <p14:creationId xmlns:p14="http://schemas.microsoft.com/office/powerpoint/2010/main" val="2117078503"/>
+        <p14:creationId xmlns:p14="http://schemas.microsoft.com/office/powerpoint/2010/main" val="662520872"/>
+      </p:ext>
+    </p:extLst>
+  </p:cSld>
+  <p:clrMapOvr>
+    <a:masterClrMapping/>
+  </p:clrMapOvr>
+</p:sld>
+</file>
+
+<file path=ppt/slides/slide8.xml><?xml version="1.0" encoding="utf-8"?>
+<p:sld xmlns:a="http://schemas.openxmlformats.org/drawingml/2006/main" xmlns:r="http://schemas.openxmlformats.org/officeDocument/2006/relationships" xmlns:p="http://schemas.openxmlformats.org/presentationml/2006/main">
+  <p:cSld>
+    <p:spTree>
+      <p:nvGrpSpPr>
+        <p:cNvPr id="1" name=""/>
+        <p:cNvGrpSpPr/>
+        <p:nvPr/>
+      </p:nvGrpSpPr>
+      <p:grpSpPr>
+        <a:xfrm>
+          <a:off x="0" y="0"/>
+          <a:ext cx="0" cy="0"/>
+          <a:chOff x="0" y="0"/>
+          <a:chExt cx="0" cy="0"/>
+        </a:xfrm>
+      </p:grpSpPr>
+      <p:sp>
+        <p:nvSpPr>
+          <p:cNvPr id="2" name="object 2">
+            <a:extLst>
+              <a:ext uri="{FF2B5EF4-FFF2-40B4-BE49-F238E27FC236}">
+                <a16:creationId xmlns:a16="http://schemas.microsoft.com/office/drawing/2014/main" id="{7719575F-1E5D-CD35-6E29-BC8177F3DCAC}"/>
+              </a:ext>
+            </a:extLst>
+          </p:cNvPr>
+          <p:cNvSpPr txBox="1"/>
+          <p:nvPr/>
+        </p:nvSpPr>
+        <p:spPr>
+          <a:xfrm>
+            <a:off x="1244439" y="637289"/>
+            <a:ext cx="9698203" cy="684803"/>
+          </a:xfrm>
+          <a:prstGeom prst="rect">
+            <a:avLst/>
+          </a:prstGeom>
+        </p:spPr>
+        <p:txBody>
+          <a:bodyPr vert="horz" wrap="square" lIns="0" tIns="12700" rIns="0" bIns="0" rtlCol="0">
+            <a:spAutoFit/>
+          </a:bodyPr>
+          <a:lstStyle/>
+          <a:p>
+            <a:pPr marL="12700">
+              <a:lnSpc>
+                <a:spcPct val="100000"/>
+              </a:lnSpc>
+              <a:spcBef>
+                <a:spcPts val="100"/>
+              </a:spcBef>
+            </a:pPr>
+            <a:r>
+              <a:rPr lang="es-MX" sz="1400" b="1" spc="-5" dirty="0">
+                <a:latin typeface="Calibri"/>
+                <a:cs typeface="Calibri"/>
+              </a:rPr>
+              <a:t>DIAGRAMA DE CLASES.</a:t>
+            </a:r>
+          </a:p>
+          <a:p>
+            <a:pPr marL="12700">
+              <a:lnSpc>
+                <a:spcPct val="100000"/>
+              </a:lnSpc>
+              <a:spcBef>
+                <a:spcPts val="100"/>
+              </a:spcBef>
+            </a:pPr>
+            <a:r>
+              <a:rPr lang="es-MX" sz="1400" b="0" i="0" dirty="0">
+                <a:solidFill>
+                  <a:srgbClr val="474747"/>
+                </a:solidFill>
+                <a:effectLst/>
+                <a:latin typeface="Google Sans"/>
+              </a:rPr>
+              <a:t> </a:t>
+            </a:r>
+            <a:r>
+              <a:rPr lang="es-MX" sz="1400" dirty="0">
+                <a:solidFill>
+                  <a:srgbClr val="040C28"/>
+                </a:solidFill>
+                <a:latin typeface="Google Sans"/>
+              </a:rPr>
+              <a:t>T</a:t>
+            </a:r>
+            <a:r>
+              <a:rPr lang="es-MX" sz="1400" b="0" i="0" dirty="0">
+                <a:solidFill>
+                  <a:srgbClr val="040C28"/>
+                </a:solidFill>
+                <a:effectLst/>
+                <a:latin typeface="Google Sans"/>
+              </a:rPr>
+              <a:t>razan claramente la estructura de un sistema concreto al modelar sus clases, atributos, operaciones y relaciones entre objetos</a:t>
+            </a:r>
+            <a:r>
+              <a:rPr lang="es-MX" sz="1400" b="0" i="0" dirty="0">
+                <a:solidFill>
+                  <a:srgbClr val="474747"/>
+                </a:solidFill>
+                <a:effectLst/>
+                <a:latin typeface="Google Sans"/>
+              </a:rPr>
+              <a:t>.</a:t>
+            </a:r>
+            <a:r>
+              <a:rPr lang="es-MX" sz="1400" b="1" spc="-5" dirty="0">
+                <a:latin typeface="Calibri"/>
+                <a:cs typeface="Calibri"/>
+              </a:rPr>
+              <a:t> </a:t>
+            </a:r>
+          </a:p>
+          <a:p>
+            <a:pPr marL="12700">
+              <a:lnSpc>
+                <a:spcPct val="100000"/>
+              </a:lnSpc>
+              <a:spcBef>
+                <a:spcPts val="100"/>
+              </a:spcBef>
+            </a:pPr>
+            <a:r>
+              <a:rPr lang="es-MX" sz="1400" spc="-5" dirty="0">
+                <a:latin typeface="Calibri"/>
+                <a:cs typeface="Calibri"/>
+              </a:rPr>
+              <a:t>.</a:t>
+            </a:r>
+            <a:endParaRPr sz="1400" dirty="0">
+              <a:latin typeface="Calibri"/>
+              <a:cs typeface="Calibri"/>
+            </a:endParaRPr>
+          </a:p>
+        </p:txBody>
+      </p:sp>
+      <p:grpSp>
+        <p:nvGrpSpPr>
+          <p:cNvPr id="5" name="object 14">
+            <a:extLst>
+              <a:ext uri="{FF2B5EF4-FFF2-40B4-BE49-F238E27FC236}">
+                <a16:creationId xmlns:a16="http://schemas.microsoft.com/office/drawing/2014/main" id="{A7BFBF45-7AFC-F135-86F9-ED6137D7D9F9}"/>
+              </a:ext>
+            </a:extLst>
+          </p:cNvPr>
+          <p:cNvGrpSpPr/>
+          <p:nvPr/>
+        </p:nvGrpSpPr>
+        <p:grpSpPr>
+          <a:xfrm>
+            <a:off x="5631221" y="6380806"/>
+            <a:ext cx="1282700" cy="343535"/>
+            <a:chOff x="3238500" y="9463405"/>
+            <a:chExt cx="1282700" cy="343535"/>
+          </a:xfrm>
+        </p:grpSpPr>
+        <p:sp>
+          <p:nvSpPr>
+            <p:cNvPr id="6" name="object 15">
+              <a:extLst>
+                <a:ext uri="{FF2B5EF4-FFF2-40B4-BE49-F238E27FC236}">
+                  <a16:creationId xmlns:a16="http://schemas.microsoft.com/office/drawing/2014/main" id="{F8A7A377-DF0A-573F-D8A2-DF0A84CBAF0F}"/>
+                </a:ext>
+              </a:extLst>
+            </p:cNvPr>
+            <p:cNvSpPr/>
+            <p:nvPr/>
+          </p:nvSpPr>
+          <p:spPr>
+            <a:xfrm>
+              <a:off x="3238500" y="9463405"/>
+              <a:ext cx="1282700" cy="343535"/>
+            </a:xfrm>
+            <a:custGeom>
+              <a:avLst/>
+              <a:gdLst/>
+              <a:ahLst/>
+              <a:cxnLst/>
+              <a:rect l="l" t="t" r="r" b="b"/>
+              <a:pathLst>
+                <a:path w="1282700" h="343534">
+                  <a:moveTo>
+                    <a:pt x="1282700" y="0"/>
+                  </a:moveTo>
+                  <a:lnTo>
+                    <a:pt x="1234583" y="6200"/>
+                  </a:lnTo>
+                  <a:lnTo>
+                    <a:pt x="1186472" y="11917"/>
+                  </a:lnTo>
+                  <a:lnTo>
+                    <a:pt x="1138366" y="17151"/>
+                  </a:lnTo>
+                  <a:lnTo>
+                    <a:pt x="1090263" y="21901"/>
+                  </a:lnTo>
+                  <a:lnTo>
+                    <a:pt x="1042161" y="26168"/>
+                  </a:lnTo>
+                  <a:lnTo>
+                    <a:pt x="994060" y="29952"/>
+                  </a:lnTo>
+                  <a:lnTo>
+                    <a:pt x="945957" y="33252"/>
+                  </a:lnTo>
+                  <a:lnTo>
+                    <a:pt x="897851" y="36070"/>
+                  </a:lnTo>
+                  <a:lnTo>
+                    <a:pt x="849740" y="38406"/>
+                  </a:lnTo>
+                  <a:lnTo>
+                    <a:pt x="801624" y="40259"/>
+                  </a:lnTo>
+                  <a:lnTo>
+                    <a:pt x="962025" y="75145"/>
+                  </a:lnTo>
+                  <a:lnTo>
+                    <a:pt x="912698" y="78194"/>
+                  </a:lnTo>
+                  <a:lnTo>
+                    <a:pt x="863367" y="80735"/>
+                  </a:lnTo>
+                  <a:lnTo>
+                    <a:pt x="814033" y="82768"/>
+                  </a:lnTo>
+                  <a:lnTo>
+                    <a:pt x="764696" y="84292"/>
+                  </a:lnTo>
+                  <a:lnTo>
+                    <a:pt x="715358" y="85308"/>
+                  </a:lnTo>
+                  <a:lnTo>
+                    <a:pt x="666019" y="85817"/>
+                  </a:lnTo>
+                  <a:lnTo>
+                    <a:pt x="616680" y="85817"/>
+                  </a:lnTo>
+                  <a:lnTo>
+                    <a:pt x="567341" y="85308"/>
+                  </a:lnTo>
+                  <a:lnTo>
+                    <a:pt x="518003" y="84292"/>
+                  </a:lnTo>
+                  <a:lnTo>
+                    <a:pt x="468666" y="82768"/>
+                  </a:lnTo>
+                  <a:lnTo>
+                    <a:pt x="419332" y="80735"/>
+                  </a:lnTo>
+                  <a:lnTo>
+                    <a:pt x="370001" y="78194"/>
+                  </a:lnTo>
+                  <a:lnTo>
+                    <a:pt x="320675" y="75145"/>
+                  </a:lnTo>
+                  <a:lnTo>
+                    <a:pt x="480949" y="40259"/>
+                  </a:lnTo>
+                  <a:lnTo>
+                    <a:pt x="432863" y="38406"/>
+                  </a:lnTo>
+                  <a:lnTo>
+                    <a:pt x="384771" y="36070"/>
+                  </a:lnTo>
+                  <a:lnTo>
+                    <a:pt x="336674" y="33252"/>
+                  </a:lnTo>
+                  <a:lnTo>
+                    <a:pt x="288575" y="29952"/>
+                  </a:lnTo>
+                  <a:lnTo>
+                    <a:pt x="240474" y="26168"/>
+                  </a:lnTo>
+                  <a:lnTo>
+                    <a:pt x="192373" y="21901"/>
+                  </a:lnTo>
+                  <a:lnTo>
+                    <a:pt x="144274" y="17151"/>
+                  </a:lnTo>
+                  <a:lnTo>
+                    <a:pt x="96177" y="11917"/>
+                  </a:lnTo>
+                  <a:lnTo>
+                    <a:pt x="48085" y="6200"/>
+                  </a:lnTo>
+                  <a:lnTo>
+                    <a:pt x="0" y="0"/>
+                  </a:lnTo>
+                  <a:lnTo>
+                    <a:pt x="160274" y="147612"/>
+                  </a:lnTo>
+                  <a:lnTo>
+                    <a:pt x="0" y="257657"/>
+                  </a:lnTo>
+                  <a:lnTo>
+                    <a:pt x="53457" y="264515"/>
+                  </a:lnTo>
+                  <a:lnTo>
+                    <a:pt x="106901" y="270777"/>
+                  </a:lnTo>
+                  <a:lnTo>
+                    <a:pt x="160337" y="276442"/>
+                  </a:lnTo>
+                  <a:lnTo>
+                    <a:pt x="213773" y="281511"/>
+                  </a:lnTo>
+                  <a:lnTo>
+                    <a:pt x="267217" y="285985"/>
+                  </a:lnTo>
+                  <a:lnTo>
+                    <a:pt x="320675" y="289864"/>
+                  </a:lnTo>
+                  <a:lnTo>
+                    <a:pt x="320675" y="332803"/>
+                  </a:lnTo>
+                  <a:lnTo>
+                    <a:pt x="370001" y="335852"/>
+                  </a:lnTo>
+                  <a:lnTo>
+                    <a:pt x="419332" y="338393"/>
+                  </a:lnTo>
+                  <a:lnTo>
+                    <a:pt x="468666" y="340425"/>
+                  </a:lnTo>
+                  <a:lnTo>
+                    <a:pt x="518003" y="341950"/>
+                  </a:lnTo>
+                  <a:lnTo>
+                    <a:pt x="567341" y="342966"/>
+                  </a:lnTo>
+                  <a:lnTo>
+                    <a:pt x="616680" y="343474"/>
+                  </a:lnTo>
+                  <a:lnTo>
+                    <a:pt x="666019" y="343474"/>
+                  </a:lnTo>
+                  <a:lnTo>
+                    <a:pt x="715358" y="342966"/>
+                  </a:lnTo>
+                  <a:lnTo>
+                    <a:pt x="764696" y="341950"/>
+                  </a:lnTo>
+                  <a:lnTo>
+                    <a:pt x="814033" y="340425"/>
+                  </a:lnTo>
+                  <a:lnTo>
+                    <a:pt x="863367" y="338393"/>
+                  </a:lnTo>
+                  <a:lnTo>
+                    <a:pt x="912698" y="335852"/>
+                  </a:lnTo>
+                  <a:lnTo>
+                    <a:pt x="962025" y="332803"/>
+                  </a:lnTo>
+                  <a:lnTo>
+                    <a:pt x="962025" y="289864"/>
+                  </a:lnTo>
+                  <a:lnTo>
+                    <a:pt x="1015482" y="285985"/>
+                  </a:lnTo>
+                  <a:lnTo>
+                    <a:pt x="1068926" y="281511"/>
+                  </a:lnTo>
+                  <a:lnTo>
+                    <a:pt x="1122362" y="276442"/>
+                  </a:lnTo>
+                  <a:lnTo>
+                    <a:pt x="1175798" y="270777"/>
+                  </a:lnTo>
+                  <a:lnTo>
+                    <a:pt x="1229242" y="264515"/>
+                  </a:lnTo>
+                  <a:lnTo>
+                    <a:pt x="1282700" y="257657"/>
+                  </a:lnTo>
+                  <a:lnTo>
+                    <a:pt x="1122299" y="147612"/>
+                  </a:lnTo>
+                  <a:lnTo>
+                    <a:pt x="1282700" y="0"/>
+                  </a:lnTo>
+                  <a:close/>
+                </a:path>
+              </a:pathLst>
+            </a:custGeom>
+            <a:solidFill>
+              <a:srgbClr val="7E5F00"/>
+            </a:solidFill>
+          </p:spPr>
+          <p:txBody>
+            <a:bodyPr wrap="square" lIns="0" tIns="0" rIns="0" bIns="0" rtlCol="0"/>
+            <a:lstStyle/>
+            <a:p>
+              <a:endParaRPr dirty="0"/>
+            </a:p>
+          </p:txBody>
+        </p:sp>
+        <p:sp>
+          <p:nvSpPr>
+            <p:cNvPr id="7" name="object 16">
+              <a:extLst>
+                <a:ext uri="{FF2B5EF4-FFF2-40B4-BE49-F238E27FC236}">
+                  <a16:creationId xmlns:a16="http://schemas.microsoft.com/office/drawing/2014/main" id="{933B0B86-D726-ED3D-8A20-E346C3DDD8BE}"/>
+                </a:ext>
+              </a:extLst>
+            </p:cNvPr>
+            <p:cNvSpPr/>
+            <p:nvPr/>
+          </p:nvSpPr>
+          <p:spPr>
+            <a:xfrm>
+              <a:off x="3559175" y="9503664"/>
+              <a:ext cx="641350" cy="45720"/>
+            </a:xfrm>
+            <a:custGeom>
+              <a:avLst/>
+              <a:gdLst/>
+              <a:ahLst/>
+              <a:cxnLst/>
+              <a:rect l="l" t="t" r="r" b="b"/>
+              <a:pathLst>
+                <a:path w="641350" h="45720">
+                  <a:moveTo>
+                    <a:pt x="332602" y="45558"/>
+                  </a:moveTo>
+                  <a:lnTo>
+                    <a:pt x="308713" y="45558"/>
+                  </a:lnTo>
+                  <a:lnTo>
+                    <a:pt x="320659" y="45624"/>
+                  </a:lnTo>
+                  <a:lnTo>
+                    <a:pt x="332602" y="45558"/>
+                  </a:lnTo>
+                  <a:close/>
+                </a:path>
+                <a:path w="641350" h="45720">
+                  <a:moveTo>
+                    <a:pt x="280960" y="45403"/>
+                  </a:moveTo>
+                  <a:lnTo>
+                    <a:pt x="296005" y="45558"/>
+                  </a:lnTo>
+                  <a:lnTo>
+                    <a:pt x="308713" y="45558"/>
+                  </a:lnTo>
+                  <a:lnTo>
+                    <a:pt x="280960" y="45403"/>
+                  </a:lnTo>
+                  <a:close/>
+                </a:path>
+                <a:path w="641350" h="45720">
+                  <a:moveTo>
+                    <a:pt x="360436" y="45402"/>
+                  </a:moveTo>
+                  <a:lnTo>
+                    <a:pt x="332602" y="45558"/>
+                  </a:lnTo>
+                  <a:lnTo>
+                    <a:pt x="345344" y="45558"/>
+                  </a:lnTo>
+                  <a:lnTo>
+                    <a:pt x="360436" y="45402"/>
+                  </a:lnTo>
+                  <a:close/>
+                </a:path>
+                <a:path w="641350" h="45720">
+                  <a:moveTo>
+                    <a:pt x="257141" y="45157"/>
+                  </a:moveTo>
+                  <a:lnTo>
+                    <a:pt x="267203" y="45326"/>
+                  </a:lnTo>
+                  <a:lnTo>
+                    <a:pt x="280960" y="45403"/>
+                  </a:lnTo>
+                  <a:lnTo>
+                    <a:pt x="257141" y="45157"/>
+                  </a:lnTo>
+                  <a:close/>
+                </a:path>
+                <a:path w="641350" h="45720">
+                  <a:moveTo>
+                    <a:pt x="384083" y="45159"/>
+                  </a:moveTo>
+                  <a:lnTo>
+                    <a:pt x="360436" y="45402"/>
+                  </a:lnTo>
+                  <a:lnTo>
+                    <a:pt x="374104" y="45326"/>
+                  </a:lnTo>
+                  <a:lnTo>
+                    <a:pt x="384083" y="45159"/>
+                  </a:lnTo>
+                  <a:close/>
+                </a:path>
+                <a:path w="641350" h="45720">
+                  <a:moveTo>
+                    <a:pt x="412503" y="44682"/>
+                  </a:moveTo>
+                  <a:lnTo>
+                    <a:pt x="384083" y="45159"/>
+                  </a:lnTo>
+                  <a:lnTo>
+                    <a:pt x="394683" y="45049"/>
+                  </a:lnTo>
+                  <a:lnTo>
+                    <a:pt x="412503" y="44682"/>
+                  </a:lnTo>
+                  <a:close/>
+                </a:path>
+                <a:path w="641350" h="45720">
+                  <a:moveTo>
+                    <a:pt x="229129" y="44688"/>
+                  </a:moveTo>
+                  <a:lnTo>
+                    <a:pt x="246666" y="45049"/>
+                  </a:lnTo>
+                  <a:lnTo>
+                    <a:pt x="257141" y="45157"/>
+                  </a:lnTo>
+                  <a:lnTo>
+                    <a:pt x="229129" y="44688"/>
+                  </a:lnTo>
+                  <a:close/>
+                </a:path>
+                <a:path w="641350" h="45720">
+                  <a:moveTo>
+                    <a:pt x="205633" y="44204"/>
+                  </a:moveTo>
+                  <a:lnTo>
+                    <a:pt x="213740" y="44430"/>
+                  </a:lnTo>
+                  <a:lnTo>
+                    <a:pt x="229129" y="44688"/>
+                  </a:lnTo>
+                  <a:lnTo>
+                    <a:pt x="205633" y="44204"/>
+                  </a:lnTo>
+                  <a:close/>
+                </a:path>
+                <a:path w="641350" h="45720">
+                  <a:moveTo>
+                    <a:pt x="435403" y="44211"/>
+                  </a:moveTo>
+                  <a:lnTo>
+                    <a:pt x="412503" y="44682"/>
+                  </a:lnTo>
+                  <a:lnTo>
+                    <a:pt x="427535" y="44430"/>
+                  </a:lnTo>
+                  <a:lnTo>
+                    <a:pt x="435403" y="44211"/>
+                  </a:lnTo>
+                  <a:close/>
+                </a:path>
+                <a:path w="641350" h="45720">
+                  <a:moveTo>
+                    <a:pt x="465379" y="43373"/>
+                  </a:moveTo>
+                  <a:lnTo>
+                    <a:pt x="435403" y="44211"/>
+                  </a:lnTo>
+                  <a:lnTo>
+                    <a:pt x="444021" y="44033"/>
+                  </a:lnTo>
+                  <a:lnTo>
+                    <a:pt x="465379" y="43373"/>
+                  </a:lnTo>
+                  <a:close/>
+                </a:path>
+                <a:path w="641350" h="45720">
+                  <a:moveTo>
+                    <a:pt x="177012" y="43405"/>
+                  </a:moveTo>
+                  <a:lnTo>
+                    <a:pt x="197328" y="44033"/>
+                  </a:lnTo>
+                  <a:lnTo>
+                    <a:pt x="205633" y="44204"/>
+                  </a:lnTo>
+                  <a:lnTo>
+                    <a:pt x="177012" y="43405"/>
+                  </a:lnTo>
+                  <a:close/>
+                </a:path>
+                <a:path w="641350" h="45720">
+                  <a:moveTo>
+                    <a:pt x="160274" y="42888"/>
+                  </a:moveTo>
+                  <a:lnTo>
+                    <a:pt x="177012" y="43405"/>
+                  </a:lnTo>
+                  <a:lnTo>
+                    <a:pt x="160274" y="42888"/>
+                  </a:lnTo>
+                  <a:close/>
+                </a:path>
+                <a:path w="641350" h="45720">
+                  <a:moveTo>
+                    <a:pt x="480949" y="42892"/>
+                  </a:moveTo>
+                  <a:lnTo>
+                    <a:pt x="465379" y="43373"/>
+                  </a:lnTo>
+                  <a:lnTo>
+                    <a:pt x="480949" y="42938"/>
+                  </a:lnTo>
+                  <a:close/>
+                </a:path>
+                <a:path w="641350" h="45720">
+                  <a:moveTo>
+                    <a:pt x="480949" y="0"/>
+                  </a:moveTo>
+                  <a:lnTo>
+                    <a:pt x="480949" y="42892"/>
+                  </a:lnTo>
+                  <a:lnTo>
+                    <a:pt x="493358" y="42509"/>
+                  </a:lnTo>
+                  <a:lnTo>
+                    <a:pt x="542692" y="40476"/>
+                  </a:lnTo>
+                  <a:lnTo>
+                    <a:pt x="592023" y="37935"/>
+                  </a:lnTo>
+                  <a:lnTo>
+                    <a:pt x="641350" y="34886"/>
+                  </a:lnTo>
+                  <a:lnTo>
+                    <a:pt x="480949" y="0"/>
+                  </a:lnTo>
+                  <a:close/>
+                </a:path>
+                <a:path w="641350" h="45720">
+                  <a:moveTo>
+                    <a:pt x="160274" y="0"/>
+                  </a:moveTo>
+                  <a:lnTo>
+                    <a:pt x="0" y="34886"/>
+                  </a:lnTo>
+                  <a:lnTo>
+                    <a:pt x="49326" y="37935"/>
+                  </a:lnTo>
+                  <a:lnTo>
+                    <a:pt x="98657" y="40476"/>
+                  </a:lnTo>
+                  <a:lnTo>
+                    <a:pt x="147991" y="42509"/>
+                  </a:lnTo>
+                  <a:lnTo>
+                    <a:pt x="160274" y="42888"/>
+                  </a:lnTo>
+                  <a:lnTo>
+                    <a:pt x="160274" y="0"/>
+                  </a:lnTo>
+                  <a:close/>
+                </a:path>
+              </a:pathLst>
+            </a:custGeom>
+            <a:solidFill>
+              <a:srgbClr val="664D00"/>
+            </a:solidFill>
+          </p:spPr>
+          <p:txBody>
+            <a:bodyPr wrap="square" lIns="0" tIns="0" rIns="0" bIns="0" rtlCol="0"/>
+            <a:lstStyle/>
+            <a:p>
+              <a:endParaRPr/>
+            </a:p>
+          </p:txBody>
+        </p:sp>
+        <p:sp>
+          <p:nvSpPr>
+            <p:cNvPr id="8" name="object 17">
+              <a:extLst>
+                <a:ext uri="{FF2B5EF4-FFF2-40B4-BE49-F238E27FC236}">
+                  <a16:creationId xmlns:a16="http://schemas.microsoft.com/office/drawing/2014/main" id="{0CFDE5B8-00FC-543E-465C-4C4202EE52AF}"/>
+                </a:ext>
+              </a:extLst>
+            </p:cNvPr>
+            <p:cNvSpPr/>
+            <p:nvPr/>
+          </p:nvSpPr>
+          <p:spPr>
+            <a:xfrm>
+              <a:off x="3238500" y="9463405"/>
+              <a:ext cx="1282700" cy="343535"/>
+            </a:xfrm>
+            <a:custGeom>
+              <a:avLst/>
+              <a:gdLst/>
+              <a:ahLst/>
+              <a:cxnLst/>
+              <a:rect l="l" t="t" r="r" b="b"/>
+              <a:pathLst>
+                <a:path w="1282700" h="343534">
+                  <a:moveTo>
+                    <a:pt x="0" y="0"/>
+                  </a:moveTo>
+                  <a:lnTo>
+                    <a:pt x="48085" y="6200"/>
+                  </a:lnTo>
+                  <a:lnTo>
+                    <a:pt x="96177" y="11917"/>
+                  </a:lnTo>
+                  <a:lnTo>
+                    <a:pt x="144274" y="17151"/>
+                  </a:lnTo>
+                  <a:lnTo>
+                    <a:pt x="192373" y="21901"/>
+                  </a:lnTo>
+                  <a:lnTo>
+                    <a:pt x="240474" y="26168"/>
+                  </a:lnTo>
+                  <a:lnTo>
+                    <a:pt x="288575" y="29952"/>
+                  </a:lnTo>
+                  <a:lnTo>
+                    <a:pt x="336674" y="33252"/>
+                  </a:lnTo>
+                  <a:lnTo>
+                    <a:pt x="384771" y="36070"/>
+                  </a:lnTo>
+                  <a:lnTo>
+                    <a:pt x="432863" y="38406"/>
+                  </a:lnTo>
+                  <a:lnTo>
+                    <a:pt x="480949" y="40259"/>
+                  </a:lnTo>
+                  <a:lnTo>
+                    <a:pt x="320675" y="75145"/>
+                  </a:lnTo>
+                  <a:lnTo>
+                    <a:pt x="370001" y="78194"/>
+                  </a:lnTo>
+                  <a:lnTo>
+                    <a:pt x="419332" y="80735"/>
+                  </a:lnTo>
+                  <a:lnTo>
+                    <a:pt x="468666" y="82768"/>
+                  </a:lnTo>
+                  <a:lnTo>
+                    <a:pt x="518003" y="84292"/>
+                  </a:lnTo>
+                  <a:lnTo>
+                    <a:pt x="567341" y="85308"/>
+                  </a:lnTo>
+                  <a:lnTo>
+                    <a:pt x="616680" y="85817"/>
+                  </a:lnTo>
+                  <a:lnTo>
+                    <a:pt x="666019" y="85817"/>
+                  </a:lnTo>
+                  <a:lnTo>
+                    <a:pt x="715358" y="85308"/>
+                  </a:lnTo>
+                  <a:lnTo>
+                    <a:pt x="764696" y="84292"/>
+                  </a:lnTo>
+                  <a:lnTo>
+                    <a:pt x="814033" y="82768"/>
+                  </a:lnTo>
+                  <a:lnTo>
+                    <a:pt x="863367" y="80735"/>
+                  </a:lnTo>
+                  <a:lnTo>
+                    <a:pt x="912698" y="78194"/>
+                  </a:lnTo>
+                  <a:lnTo>
+                    <a:pt x="962025" y="75145"/>
+                  </a:lnTo>
+                  <a:lnTo>
+                    <a:pt x="801624" y="40259"/>
+                  </a:lnTo>
+                  <a:lnTo>
+                    <a:pt x="849740" y="38406"/>
+                  </a:lnTo>
+                  <a:lnTo>
+                    <a:pt x="897851" y="36070"/>
+                  </a:lnTo>
+                  <a:lnTo>
+                    <a:pt x="945957" y="33252"/>
+                  </a:lnTo>
+                  <a:lnTo>
+                    <a:pt x="994060" y="29952"/>
+                  </a:lnTo>
+                  <a:lnTo>
+                    <a:pt x="1042161" y="26168"/>
+                  </a:lnTo>
+                  <a:lnTo>
+                    <a:pt x="1090263" y="21901"/>
+                  </a:lnTo>
+                  <a:lnTo>
+                    <a:pt x="1138366" y="17151"/>
+                  </a:lnTo>
+                  <a:lnTo>
+                    <a:pt x="1186472" y="11917"/>
+                  </a:lnTo>
+                  <a:lnTo>
+                    <a:pt x="1234583" y="6200"/>
+                  </a:lnTo>
+                  <a:lnTo>
+                    <a:pt x="1282700" y="0"/>
+                  </a:lnTo>
+                  <a:lnTo>
+                    <a:pt x="1122299" y="147612"/>
+                  </a:lnTo>
+                  <a:lnTo>
+                    <a:pt x="1282700" y="257657"/>
+                  </a:lnTo>
+                  <a:lnTo>
+                    <a:pt x="1229242" y="264515"/>
+                  </a:lnTo>
+                  <a:lnTo>
+                    <a:pt x="1175798" y="270777"/>
+                  </a:lnTo>
+                  <a:lnTo>
+                    <a:pt x="1122362" y="276442"/>
+                  </a:lnTo>
+                  <a:lnTo>
+                    <a:pt x="1068926" y="281511"/>
+                  </a:lnTo>
+                  <a:lnTo>
+                    <a:pt x="1015482" y="285985"/>
+                  </a:lnTo>
+                  <a:lnTo>
+                    <a:pt x="962025" y="289864"/>
+                  </a:lnTo>
+                  <a:lnTo>
+                    <a:pt x="962025" y="332803"/>
+                  </a:lnTo>
+                  <a:lnTo>
+                    <a:pt x="912698" y="335852"/>
+                  </a:lnTo>
+                  <a:lnTo>
+                    <a:pt x="863367" y="338393"/>
+                  </a:lnTo>
+                  <a:lnTo>
+                    <a:pt x="814033" y="340425"/>
+                  </a:lnTo>
+                  <a:lnTo>
+                    <a:pt x="764696" y="341950"/>
+                  </a:lnTo>
+                  <a:lnTo>
+                    <a:pt x="715358" y="342966"/>
+                  </a:lnTo>
+                  <a:lnTo>
+                    <a:pt x="666019" y="343474"/>
+                  </a:lnTo>
+                  <a:lnTo>
+                    <a:pt x="616680" y="343474"/>
+                  </a:lnTo>
+                  <a:lnTo>
+                    <a:pt x="567341" y="342966"/>
+                  </a:lnTo>
+                  <a:lnTo>
+                    <a:pt x="518003" y="341950"/>
+                  </a:lnTo>
+                  <a:lnTo>
+                    <a:pt x="468666" y="340425"/>
+                  </a:lnTo>
+                  <a:lnTo>
+                    <a:pt x="419332" y="338393"/>
+                  </a:lnTo>
+                  <a:lnTo>
+                    <a:pt x="370001" y="335852"/>
+                  </a:lnTo>
+                  <a:lnTo>
+                    <a:pt x="320675" y="332803"/>
+                  </a:lnTo>
+                  <a:lnTo>
+                    <a:pt x="320675" y="289864"/>
+                  </a:lnTo>
+                  <a:lnTo>
+                    <a:pt x="267217" y="285985"/>
+                  </a:lnTo>
+                  <a:lnTo>
+                    <a:pt x="213773" y="281511"/>
+                  </a:lnTo>
+                  <a:lnTo>
+                    <a:pt x="160337" y="276442"/>
+                  </a:lnTo>
+                  <a:lnTo>
+                    <a:pt x="106901" y="270777"/>
+                  </a:lnTo>
+                  <a:lnTo>
+                    <a:pt x="53457" y="264515"/>
+                  </a:lnTo>
+                  <a:lnTo>
+                    <a:pt x="0" y="257657"/>
+                  </a:lnTo>
+                  <a:lnTo>
+                    <a:pt x="160274" y="147612"/>
+                  </a:lnTo>
+                  <a:lnTo>
+                    <a:pt x="0" y="0"/>
+                  </a:lnTo>
+                  <a:close/>
+                </a:path>
+                <a:path w="1282700" h="343534">
+                  <a:moveTo>
+                    <a:pt x="320675" y="289864"/>
+                  </a:moveTo>
+                  <a:lnTo>
+                    <a:pt x="320675" y="75145"/>
+                  </a:lnTo>
+                </a:path>
+                <a:path w="1282700" h="343534">
+                  <a:moveTo>
+                    <a:pt x="962025" y="75145"/>
+                  </a:moveTo>
+                  <a:lnTo>
+                    <a:pt x="962025" y="289864"/>
+                  </a:lnTo>
+                </a:path>
+                <a:path w="1282700" h="343534">
+                  <a:moveTo>
+                    <a:pt x="480949" y="40259"/>
+                  </a:moveTo>
+                  <a:lnTo>
+                    <a:pt x="480949" y="83197"/>
+                  </a:lnTo>
+                </a:path>
+                <a:path w="1282700" h="343534">
+                  <a:moveTo>
+                    <a:pt x="801624" y="83197"/>
+                  </a:moveTo>
+                  <a:lnTo>
+                    <a:pt x="801624" y="40259"/>
+                  </a:lnTo>
+                </a:path>
+              </a:pathLst>
+            </a:custGeom>
+            <a:ln w="9525">
+              <a:solidFill>
+                <a:srgbClr val="FFC000"/>
+              </a:solidFill>
+            </a:ln>
+          </p:spPr>
+          <p:txBody>
+            <a:bodyPr wrap="square" lIns="0" tIns="0" rIns="0" bIns="0" rtlCol="0"/>
+            <a:lstStyle/>
+            <a:p>
+              <a:endParaRPr dirty="0"/>
+            </a:p>
+          </p:txBody>
+        </p:sp>
+      </p:grpSp>
+      <p:sp>
+        <p:nvSpPr>
+          <p:cNvPr id="9" name="CuadroTexto 8">
+            <a:extLst>
+              <a:ext uri="{FF2B5EF4-FFF2-40B4-BE49-F238E27FC236}">
+                <a16:creationId xmlns:a16="http://schemas.microsoft.com/office/drawing/2014/main" id="{C3AAE22D-A715-25C9-3268-88385C1E6EC2}"/>
+              </a:ext>
+            </a:extLst>
+          </p:cNvPr>
+          <p:cNvSpPr txBox="1"/>
+          <p:nvPr/>
+        </p:nvSpPr>
+        <p:spPr>
+          <a:xfrm>
+            <a:off x="6093541" y="6421065"/>
+            <a:ext cx="575187" cy="400110"/>
+          </a:xfrm>
+          <a:prstGeom prst="rect">
+            <a:avLst/>
+          </a:prstGeom>
+          <a:noFill/>
+        </p:spPr>
+        <p:txBody>
+          <a:bodyPr wrap="square" rtlCol="0">
+            <a:spAutoFit/>
+          </a:bodyPr>
+          <a:lstStyle/>
+          <a:p>
+            <a:r>
+              <a:rPr lang="es-MX" sz="2000" dirty="0">
+                <a:solidFill>
+                  <a:schemeClr val="bg1"/>
+                </a:solidFill>
+              </a:rPr>
+              <a:t>8</a:t>
+            </a:r>
+          </a:p>
+        </p:txBody>
+      </p:sp>
+      <p:sp>
+        <p:nvSpPr>
+          <p:cNvPr id="10" name="Rectángulo 9">
+            <a:extLst>
+              <a:ext uri="{FF2B5EF4-FFF2-40B4-BE49-F238E27FC236}">
+                <a16:creationId xmlns:a16="http://schemas.microsoft.com/office/drawing/2014/main" id="{F0A3EE6C-DFA2-0245-9DAC-A91B11E90405}"/>
+              </a:ext>
+            </a:extLst>
+          </p:cNvPr>
+          <p:cNvSpPr/>
+          <p:nvPr/>
+        </p:nvSpPr>
+        <p:spPr>
+          <a:xfrm>
+            <a:off x="1" y="0"/>
+            <a:ext cx="12192000" cy="438277"/>
+          </a:xfrm>
+          <a:prstGeom prst="rect">
+            <a:avLst/>
+          </a:prstGeom>
+          <a:solidFill>
+            <a:schemeClr val="accent6">
+              <a:lumMod val="75000"/>
+            </a:schemeClr>
+          </a:solidFill>
+        </p:spPr>
+        <p:style>
+          <a:lnRef idx="2">
+            <a:schemeClr val="accent1">
+              <a:shade val="15000"/>
+            </a:schemeClr>
+          </a:lnRef>
+          <a:fillRef idx="1">
+            <a:schemeClr val="accent1"/>
+          </a:fillRef>
+          <a:effectRef idx="0">
+            <a:schemeClr val="accent1"/>
+          </a:effectRef>
+          <a:fontRef idx="minor">
+            <a:schemeClr val="lt1"/>
+          </a:fontRef>
+        </p:style>
+        <p:txBody>
+          <a:bodyPr rtlCol="0" anchor="ctr"/>
+          <a:lstStyle/>
+          <a:p>
+            <a:pPr algn="r"/>
+            <a:r>
+              <a:rPr lang="es-MX" dirty="0">
+                <a:solidFill>
+                  <a:srgbClr val="FFFF00"/>
+                </a:solidFill>
+                <a:latin typeface="Berlin Sans FB Demi" panose="020E0802020502020306" pitchFamily="34" charset="0"/>
+              </a:rPr>
+              <a:t>MANUAL TECNICO</a:t>
+            </a:r>
+          </a:p>
+        </p:txBody>
+      </p:sp>
+      <p:pic>
+        <p:nvPicPr>
+          <p:cNvPr id="11" name="Imagen 10" descr="Diagrama&#10;&#10;Descripción generada automáticamente">
+            <a:extLst>
+              <a:ext uri="{FF2B5EF4-FFF2-40B4-BE49-F238E27FC236}">
+                <a16:creationId xmlns:a16="http://schemas.microsoft.com/office/drawing/2014/main" id="{C4CE7A88-19A1-5DFF-22DF-AA22B3CCAC62}"/>
+              </a:ext>
+            </a:extLst>
+          </p:cNvPr>
+          <p:cNvPicPr>
+            <a:picLocks noChangeAspect="1"/>
+          </p:cNvPicPr>
+          <p:nvPr/>
+        </p:nvPicPr>
+        <p:blipFill>
+          <a:blip r:embed="rId2">
+            <a:extLst>
+              <a:ext uri="{28A0092B-C50C-407E-A947-70E740481C1C}">
+                <a14:useLocalDpi xmlns:a14="http://schemas.microsoft.com/office/drawing/2010/main" val="0"/>
+              </a:ext>
+            </a:extLst>
+          </a:blip>
+          <a:stretch>
+            <a:fillRect/>
+          </a:stretch>
+        </p:blipFill>
+        <p:spPr>
+          <a:xfrm>
+            <a:off x="1707587" y="1439508"/>
+            <a:ext cx="8336066" cy="4832728"/>
+          </a:xfrm>
+          <a:prstGeom prst="rect">
+            <a:avLst/>
+          </a:prstGeom>
+          <a:ln>
+            <a:noFill/>
+          </a:ln>
+          <a:effectLst>
+            <a:outerShdw blurRad="292100" dist="139700" dir="2700000" algn="tl" rotWithShape="0">
+              <a:srgbClr val="333333">
+                <a:alpha val="65000"/>
+              </a:srgbClr>
+            </a:outerShdw>
+          </a:effectLst>
+        </p:spPr>
+      </p:pic>
+    </p:spTree>
+    <p:extLst>
+      <p:ext uri="{BB962C8B-B14F-4D97-AF65-F5344CB8AC3E}">
+        <p14:creationId xmlns:p14="http://schemas.microsoft.com/office/powerpoint/2010/main" val="2430589331"/>
+      </p:ext>
+    </p:extLst>
+  </p:cSld>
+  <p:clrMapOvr>
+    <a:masterClrMapping/>
+  </p:clrMapOvr>
+</p:sld>
+</file>
+
+<file path=ppt/slides/slide9.xml><?xml version="1.0" encoding="utf-8"?>
+<p:sld xmlns:a="http://schemas.openxmlformats.org/drawingml/2006/main" xmlns:r="http://schemas.openxmlformats.org/officeDocument/2006/relationships" xmlns:p="http://schemas.openxmlformats.org/presentationml/2006/main">
+  <p:cSld>
+    <p:spTree>
+      <p:nvGrpSpPr>
+        <p:cNvPr id="1" name=""/>
+        <p:cNvGrpSpPr/>
+        <p:nvPr/>
+      </p:nvGrpSpPr>
+      <p:grpSpPr>
+        <a:xfrm>
+          <a:off x="0" y="0"/>
+          <a:ext cx="0" cy="0"/>
+          <a:chOff x="0" y="0"/>
+          <a:chExt cx="0" cy="0"/>
+        </a:xfrm>
+      </p:grpSpPr>
+      <p:sp>
+        <p:nvSpPr>
+          <p:cNvPr id="2" name="object 2">
+            <a:extLst>
+              <a:ext uri="{FF2B5EF4-FFF2-40B4-BE49-F238E27FC236}">
+                <a16:creationId xmlns:a16="http://schemas.microsoft.com/office/drawing/2014/main" id="{7719575F-1E5D-CD35-6E29-BC8177F3DCAC}"/>
+              </a:ext>
+            </a:extLst>
+          </p:cNvPr>
+          <p:cNvSpPr txBox="1"/>
+          <p:nvPr/>
+        </p:nvSpPr>
+        <p:spPr>
+          <a:xfrm>
+            <a:off x="1244439" y="637289"/>
+            <a:ext cx="9698203" cy="792974"/>
+          </a:xfrm>
+          <a:prstGeom prst="rect">
+            <a:avLst/>
+          </a:prstGeom>
+        </p:spPr>
+        <p:txBody>
+          <a:bodyPr vert="horz" wrap="square" lIns="0" tIns="12700" rIns="0" bIns="0" rtlCol="0">
+            <a:spAutoFit/>
+          </a:bodyPr>
+          <a:lstStyle/>
+          <a:p>
+            <a:pPr marL="12700">
+              <a:lnSpc>
+                <a:spcPct val="100000"/>
+              </a:lnSpc>
+              <a:spcBef>
+                <a:spcPts val="100"/>
+              </a:spcBef>
+            </a:pPr>
+            <a:r>
+              <a:rPr lang="es-MX" sz="1400" b="1" spc="-5" dirty="0">
+                <a:latin typeface="Calibri"/>
+                <a:cs typeface="Calibri"/>
+              </a:rPr>
+              <a:t>DIAGRAMA DE DESPLIEGUE</a:t>
+            </a:r>
+            <a:endParaRPr lang="es-MX" sz="1400" dirty="0">
+              <a:latin typeface="Calibri"/>
+              <a:cs typeface="Calibri"/>
+            </a:endParaRPr>
+          </a:p>
+          <a:p>
+            <a:pPr marL="12700" marR="5080">
+              <a:lnSpc>
+                <a:spcPct val="110000"/>
+              </a:lnSpc>
+              <a:spcBef>
+                <a:spcPts val="840"/>
+              </a:spcBef>
+            </a:pPr>
+            <a:r>
+              <a:rPr lang="es-MX" sz="1400" b="0" i="0" spc="-5" dirty="0">
+                <a:solidFill>
+                  <a:srgbClr val="1C1C1E"/>
+                </a:solidFill>
+                <a:effectLst/>
+                <a:latin typeface="Calibri"/>
+                <a:cs typeface="Calibri"/>
+              </a:rPr>
+              <a:t>M</a:t>
+            </a:r>
+            <a:r>
+              <a:rPr lang="es-MX" sz="1400" b="0" i="0" dirty="0">
+                <a:solidFill>
+                  <a:srgbClr val="1C1C1E"/>
+                </a:solidFill>
+                <a:effectLst/>
+                <a:latin typeface="Roobert PRO"/>
+              </a:rPr>
+              <a:t>uestra el despliegue físico de artefactos en nodos. Para decirlo simplemente, describen los componentes de hardware donde se instalan los componentes de software. </a:t>
+            </a:r>
+            <a:endParaRPr lang="es-MX" sz="1400" dirty="0">
+              <a:latin typeface="Calibri"/>
+              <a:cs typeface="Calibri"/>
+            </a:endParaRPr>
+          </a:p>
+        </p:txBody>
+      </p:sp>
+      <p:grpSp>
+        <p:nvGrpSpPr>
+          <p:cNvPr id="5" name="object 14">
+            <a:extLst>
+              <a:ext uri="{FF2B5EF4-FFF2-40B4-BE49-F238E27FC236}">
+                <a16:creationId xmlns:a16="http://schemas.microsoft.com/office/drawing/2014/main" id="{A7BFBF45-7AFC-F135-86F9-ED6137D7D9F9}"/>
+              </a:ext>
+            </a:extLst>
+          </p:cNvPr>
+          <p:cNvGrpSpPr/>
+          <p:nvPr/>
+        </p:nvGrpSpPr>
+        <p:grpSpPr>
+          <a:xfrm>
+            <a:off x="5631221" y="6380806"/>
+            <a:ext cx="1282700" cy="343535"/>
+            <a:chOff x="3238500" y="9463405"/>
+            <a:chExt cx="1282700" cy="343535"/>
+          </a:xfrm>
+        </p:grpSpPr>
+        <p:sp>
+          <p:nvSpPr>
+            <p:cNvPr id="6" name="object 15">
+              <a:extLst>
+                <a:ext uri="{FF2B5EF4-FFF2-40B4-BE49-F238E27FC236}">
+                  <a16:creationId xmlns:a16="http://schemas.microsoft.com/office/drawing/2014/main" id="{F8A7A377-DF0A-573F-D8A2-DF0A84CBAF0F}"/>
+                </a:ext>
+              </a:extLst>
+            </p:cNvPr>
+            <p:cNvSpPr/>
+            <p:nvPr/>
+          </p:nvSpPr>
+          <p:spPr>
+            <a:xfrm>
+              <a:off x="3238500" y="9463405"/>
+              <a:ext cx="1282700" cy="343535"/>
+            </a:xfrm>
+            <a:custGeom>
+              <a:avLst/>
+              <a:gdLst/>
+              <a:ahLst/>
+              <a:cxnLst/>
+              <a:rect l="l" t="t" r="r" b="b"/>
+              <a:pathLst>
+                <a:path w="1282700" h="343534">
+                  <a:moveTo>
+                    <a:pt x="1282700" y="0"/>
+                  </a:moveTo>
+                  <a:lnTo>
+                    <a:pt x="1234583" y="6200"/>
+                  </a:lnTo>
+                  <a:lnTo>
+                    <a:pt x="1186472" y="11917"/>
+                  </a:lnTo>
+                  <a:lnTo>
+                    <a:pt x="1138366" y="17151"/>
+                  </a:lnTo>
+                  <a:lnTo>
+                    <a:pt x="1090263" y="21901"/>
+                  </a:lnTo>
+                  <a:lnTo>
+                    <a:pt x="1042161" y="26168"/>
+                  </a:lnTo>
+                  <a:lnTo>
+                    <a:pt x="994060" y="29952"/>
+                  </a:lnTo>
+                  <a:lnTo>
+                    <a:pt x="945957" y="33252"/>
+                  </a:lnTo>
+                  <a:lnTo>
+                    <a:pt x="897851" y="36070"/>
+                  </a:lnTo>
+                  <a:lnTo>
+                    <a:pt x="849740" y="38406"/>
+                  </a:lnTo>
+                  <a:lnTo>
+                    <a:pt x="801624" y="40259"/>
+                  </a:lnTo>
+                  <a:lnTo>
+                    <a:pt x="962025" y="75145"/>
+                  </a:lnTo>
+                  <a:lnTo>
+                    <a:pt x="912698" y="78194"/>
+                  </a:lnTo>
+                  <a:lnTo>
+                    <a:pt x="863367" y="80735"/>
+                  </a:lnTo>
+                  <a:lnTo>
+                    <a:pt x="814033" y="82768"/>
+                  </a:lnTo>
+                  <a:lnTo>
+                    <a:pt x="764696" y="84292"/>
+                  </a:lnTo>
+                  <a:lnTo>
+                    <a:pt x="715358" y="85308"/>
+                  </a:lnTo>
+                  <a:lnTo>
+                    <a:pt x="666019" y="85817"/>
+                  </a:lnTo>
+                  <a:lnTo>
+                    <a:pt x="616680" y="85817"/>
+                  </a:lnTo>
+                  <a:lnTo>
+                    <a:pt x="567341" y="85308"/>
+                  </a:lnTo>
+                  <a:lnTo>
+                    <a:pt x="518003" y="84292"/>
+                  </a:lnTo>
+                  <a:lnTo>
+                    <a:pt x="468666" y="82768"/>
+                  </a:lnTo>
+                  <a:lnTo>
+                    <a:pt x="419332" y="80735"/>
+                  </a:lnTo>
+                  <a:lnTo>
+                    <a:pt x="370001" y="78194"/>
+                  </a:lnTo>
+                  <a:lnTo>
+                    <a:pt x="320675" y="75145"/>
+                  </a:lnTo>
+                  <a:lnTo>
+                    <a:pt x="480949" y="40259"/>
+                  </a:lnTo>
+                  <a:lnTo>
+                    <a:pt x="432863" y="38406"/>
+                  </a:lnTo>
+                  <a:lnTo>
+                    <a:pt x="384771" y="36070"/>
+                  </a:lnTo>
+                  <a:lnTo>
+                    <a:pt x="336674" y="33252"/>
+                  </a:lnTo>
+                  <a:lnTo>
+                    <a:pt x="288575" y="29952"/>
+                  </a:lnTo>
+                  <a:lnTo>
+                    <a:pt x="240474" y="26168"/>
+                  </a:lnTo>
+                  <a:lnTo>
+                    <a:pt x="192373" y="21901"/>
+                  </a:lnTo>
+                  <a:lnTo>
+                    <a:pt x="144274" y="17151"/>
+                  </a:lnTo>
+                  <a:lnTo>
+                    <a:pt x="96177" y="11917"/>
+                  </a:lnTo>
+                  <a:lnTo>
+                    <a:pt x="48085" y="6200"/>
+                  </a:lnTo>
+                  <a:lnTo>
+                    <a:pt x="0" y="0"/>
+                  </a:lnTo>
+                  <a:lnTo>
+                    <a:pt x="160274" y="147612"/>
+                  </a:lnTo>
+                  <a:lnTo>
+                    <a:pt x="0" y="257657"/>
+                  </a:lnTo>
+                  <a:lnTo>
+                    <a:pt x="53457" y="264515"/>
+                  </a:lnTo>
+                  <a:lnTo>
+                    <a:pt x="106901" y="270777"/>
+                  </a:lnTo>
+                  <a:lnTo>
+                    <a:pt x="160337" y="276442"/>
+                  </a:lnTo>
+                  <a:lnTo>
+                    <a:pt x="213773" y="281511"/>
+                  </a:lnTo>
+                  <a:lnTo>
+                    <a:pt x="267217" y="285985"/>
+                  </a:lnTo>
+                  <a:lnTo>
+                    <a:pt x="320675" y="289864"/>
+                  </a:lnTo>
+                  <a:lnTo>
+                    <a:pt x="320675" y="332803"/>
+                  </a:lnTo>
+                  <a:lnTo>
+                    <a:pt x="370001" y="335852"/>
+                  </a:lnTo>
+                  <a:lnTo>
+                    <a:pt x="419332" y="338393"/>
+                  </a:lnTo>
+                  <a:lnTo>
+                    <a:pt x="468666" y="340425"/>
+                  </a:lnTo>
+                  <a:lnTo>
+                    <a:pt x="518003" y="341950"/>
+                  </a:lnTo>
+                  <a:lnTo>
+                    <a:pt x="567341" y="342966"/>
+                  </a:lnTo>
+                  <a:lnTo>
+                    <a:pt x="616680" y="343474"/>
+                  </a:lnTo>
+                  <a:lnTo>
+                    <a:pt x="666019" y="343474"/>
+                  </a:lnTo>
+                  <a:lnTo>
+                    <a:pt x="715358" y="342966"/>
+                  </a:lnTo>
+                  <a:lnTo>
+                    <a:pt x="764696" y="341950"/>
+                  </a:lnTo>
+                  <a:lnTo>
+                    <a:pt x="814033" y="340425"/>
+                  </a:lnTo>
+                  <a:lnTo>
+                    <a:pt x="863367" y="338393"/>
+                  </a:lnTo>
+                  <a:lnTo>
+                    <a:pt x="912698" y="335852"/>
+                  </a:lnTo>
+                  <a:lnTo>
+                    <a:pt x="962025" y="332803"/>
+                  </a:lnTo>
+                  <a:lnTo>
+                    <a:pt x="962025" y="289864"/>
+                  </a:lnTo>
+                  <a:lnTo>
+                    <a:pt x="1015482" y="285985"/>
+                  </a:lnTo>
+                  <a:lnTo>
+                    <a:pt x="1068926" y="281511"/>
+                  </a:lnTo>
+                  <a:lnTo>
+                    <a:pt x="1122362" y="276442"/>
+                  </a:lnTo>
+                  <a:lnTo>
+                    <a:pt x="1175798" y="270777"/>
+                  </a:lnTo>
+                  <a:lnTo>
+                    <a:pt x="1229242" y="264515"/>
+                  </a:lnTo>
+                  <a:lnTo>
+                    <a:pt x="1282700" y="257657"/>
+                  </a:lnTo>
+                  <a:lnTo>
+                    <a:pt x="1122299" y="147612"/>
+                  </a:lnTo>
+                  <a:lnTo>
+                    <a:pt x="1282700" y="0"/>
+                  </a:lnTo>
+                  <a:close/>
+                </a:path>
+              </a:pathLst>
+            </a:custGeom>
+            <a:solidFill>
+              <a:srgbClr val="7E5F00"/>
+            </a:solidFill>
+          </p:spPr>
+          <p:txBody>
+            <a:bodyPr wrap="square" lIns="0" tIns="0" rIns="0" bIns="0" rtlCol="0"/>
+            <a:lstStyle/>
+            <a:p>
+              <a:endParaRPr dirty="0"/>
+            </a:p>
+          </p:txBody>
+        </p:sp>
+        <p:sp>
+          <p:nvSpPr>
+            <p:cNvPr id="7" name="object 16">
+              <a:extLst>
+                <a:ext uri="{FF2B5EF4-FFF2-40B4-BE49-F238E27FC236}">
+                  <a16:creationId xmlns:a16="http://schemas.microsoft.com/office/drawing/2014/main" id="{933B0B86-D726-ED3D-8A20-E346C3DDD8BE}"/>
+                </a:ext>
+              </a:extLst>
+            </p:cNvPr>
+            <p:cNvSpPr/>
+            <p:nvPr/>
+          </p:nvSpPr>
+          <p:spPr>
+            <a:xfrm>
+              <a:off x="3559175" y="9503664"/>
+              <a:ext cx="641350" cy="45720"/>
+            </a:xfrm>
+            <a:custGeom>
+              <a:avLst/>
+              <a:gdLst/>
+              <a:ahLst/>
+              <a:cxnLst/>
+              <a:rect l="l" t="t" r="r" b="b"/>
+              <a:pathLst>
+                <a:path w="641350" h="45720">
+                  <a:moveTo>
+                    <a:pt x="332602" y="45558"/>
+                  </a:moveTo>
+                  <a:lnTo>
+                    <a:pt x="308713" y="45558"/>
+                  </a:lnTo>
+                  <a:lnTo>
+                    <a:pt x="320659" y="45624"/>
+                  </a:lnTo>
+                  <a:lnTo>
+                    <a:pt x="332602" y="45558"/>
+                  </a:lnTo>
+                  <a:close/>
+                </a:path>
+                <a:path w="641350" h="45720">
+                  <a:moveTo>
+                    <a:pt x="280960" y="45403"/>
+                  </a:moveTo>
+                  <a:lnTo>
+                    <a:pt x="296005" y="45558"/>
+                  </a:lnTo>
+                  <a:lnTo>
+                    <a:pt x="308713" y="45558"/>
+                  </a:lnTo>
+                  <a:lnTo>
+                    <a:pt x="280960" y="45403"/>
+                  </a:lnTo>
+                  <a:close/>
+                </a:path>
+                <a:path w="641350" h="45720">
+                  <a:moveTo>
+                    <a:pt x="360436" y="45402"/>
+                  </a:moveTo>
+                  <a:lnTo>
+                    <a:pt x="332602" y="45558"/>
+                  </a:lnTo>
+                  <a:lnTo>
+                    <a:pt x="345344" y="45558"/>
+                  </a:lnTo>
+                  <a:lnTo>
+                    <a:pt x="360436" y="45402"/>
+                  </a:lnTo>
+                  <a:close/>
+                </a:path>
+                <a:path w="641350" h="45720">
+                  <a:moveTo>
+                    <a:pt x="257141" y="45157"/>
+                  </a:moveTo>
+                  <a:lnTo>
+                    <a:pt x="267203" y="45326"/>
+                  </a:lnTo>
+                  <a:lnTo>
+                    <a:pt x="280960" y="45403"/>
+                  </a:lnTo>
+                  <a:lnTo>
+                    <a:pt x="257141" y="45157"/>
+                  </a:lnTo>
+                  <a:close/>
+                </a:path>
+                <a:path w="641350" h="45720">
+                  <a:moveTo>
+                    <a:pt x="384083" y="45159"/>
+                  </a:moveTo>
+                  <a:lnTo>
+                    <a:pt x="360436" y="45402"/>
+                  </a:lnTo>
+                  <a:lnTo>
+                    <a:pt x="374104" y="45326"/>
+                  </a:lnTo>
+                  <a:lnTo>
+                    <a:pt x="384083" y="45159"/>
+                  </a:lnTo>
+                  <a:close/>
+                </a:path>
+                <a:path w="641350" h="45720">
+                  <a:moveTo>
+                    <a:pt x="412503" y="44682"/>
+                  </a:moveTo>
+                  <a:lnTo>
+                    <a:pt x="384083" y="45159"/>
+                  </a:lnTo>
+                  <a:lnTo>
+                    <a:pt x="394683" y="45049"/>
+                  </a:lnTo>
+                  <a:lnTo>
+                    <a:pt x="412503" y="44682"/>
+                  </a:lnTo>
+                  <a:close/>
+                </a:path>
+                <a:path w="641350" h="45720">
+                  <a:moveTo>
+                    <a:pt x="229129" y="44688"/>
+                  </a:moveTo>
+                  <a:lnTo>
+                    <a:pt x="246666" y="45049"/>
+                  </a:lnTo>
+                  <a:lnTo>
+                    <a:pt x="257141" y="45157"/>
+                  </a:lnTo>
+                  <a:lnTo>
+                    <a:pt x="229129" y="44688"/>
+                  </a:lnTo>
+                  <a:close/>
+                </a:path>
+                <a:path w="641350" h="45720">
+                  <a:moveTo>
+                    <a:pt x="205633" y="44204"/>
+                  </a:moveTo>
+                  <a:lnTo>
+                    <a:pt x="213740" y="44430"/>
+                  </a:lnTo>
+                  <a:lnTo>
+                    <a:pt x="229129" y="44688"/>
+                  </a:lnTo>
+                  <a:lnTo>
+                    <a:pt x="205633" y="44204"/>
+                  </a:lnTo>
+                  <a:close/>
+                </a:path>
+                <a:path w="641350" h="45720">
+                  <a:moveTo>
+                    <a:pt x="435403" y="44211"/>
+                  </a:moveTo>
+                  <a:lnTo>
+                    <a:pt x="412503" y="44682"/>
+                  </a:lnTo>
+                  <a:lnTo>
+                    <a:pt x="427535" y="44430"/>
+                  </a:lnTo>
+                  <a:lnTo>
+                    <a:pt x="435403" y="44211"/>
+                  </a:lnTo>
+                  <a:close/>
+                </a:path>
+                <a:path w="641350" h="45720">
+                  <a:moveTo>
+                    <a:pt x="465379" y="43373"/>
+                  </a:moveTo>
+                  <a:lnTo>
+                    <a:pt x="435403" y="44211"/>
+                  </a:lnTo>
+                  <a:lnTo>
+                    <a:pt x="444021" y="44033"/>
+                  </a:lnTo>
+                  <a:lnTo>
+                    <a:pt x="465379" y="43373"/>
+                  </a:lnTo>
+                  <a:close/>
+                </a:path>
+                <a:path w="641350" h="45720">
+                  <a:moveTo>
+                    <a:pt x="177012" y="43405"/>
+                  </a:moveTo>
+                  <a:lnTo>
+                    <a:pt x="197328" y="44033"/>
+                  </a:lnTo>
+                  <a:lnTo>
+                    <a:pt x="205633" y="44204"/>
+                  </a:lnTo>
+                  <a:lnTo>
+                    <a:pt x="177012" y="43405"/>
+                  </a:lnTo>
+                  <a:close/>
+                </a:path>
+                <a:path w="641350" h="45720">
+                  <a:moveTo>
+                    <a:pt x="160274" y="42888"/>
+                  </a:moveTo>
+                  <a:lnTo>
+                    <a:pt x="177012" y="43405"/>
+                  </a:lnTo>
+                  <a:lnTo>
+                    <a:pt x="160274" y="42888"/>
+                  </a:lnTo>
+                  <a:close/>
+                </a:path>
+                <a:path w="641350" h="45720">
+                  <a:moveTo>
+                    <a:pt x="480949" y="42892"/>
+                  </a:moveTo>
+                  <a:lnTo>
+                    <a:pt x="465379" y="43373"/>
+                  </a:lnTo>
+                  <a:lnTo>
+                    <a:pt x="480949" y="42938"/>
+                  </a:lnTo>
+                  <a:close/>
+                </a:path>
+                <a:path w="641350" h="45720">
+                  <a:moveTo>
+                    <a:pt x="480949" y="0"/>
+                  </a:moveTo>
+                  <a:lnTo>
+                    <a:pt x="480949" y="42892"/>
+                  </a:lnTo>
+                  <a:lnTo>
+                    <a:pt x="493358" y="42509"/>
+                  </a:lnTo>
+                  <a:lnTo>
+                    <a:pt x="542692" y="40476"/>
+                  </a:lnTo>
+                  <a:lnTo>
+                    <a:pt x="592023" y="37935"/>
+                  </a:lnTo>
+                  <a:lnTo>
+                    <a:pt x="641350" y="34886"/>
+                  </a:lnTo>
+                  <a:lnTo>
+                    <a:pt x="480949" y="0"/>
+                  </a:lnTo>
+                  <a:close/>
+                </a:path>
+                <a:path w="641350" h="45720">
+                  <a:moveTo>
+                    <a:pt x="160274" y="0"/>
+                  </a:moveTo>
+                  <a:lnTo>
+                    <a:pt x="0" y="34886"/>
+                  </a:lnTo>
+                  <a:lnTo>
+                    <a:pt x="49326" y="37935"/>
+                  </a:lnTo>
+                  <a:lnTo>
+                    <a:pt x="98657" y="40476"/>
+                  </a:lnTo>
+                  <a:lnTo>
+                    <a:pt x="147991" y="42509"/>
+                  </a:lnTo>
+                  <a:lnTo>
+                    <a:pt x="160274" y="42888"/>
+                  </a:lnTo>
+                  <a:lnTo>
+                    <a:pt x="160274" y="0"/>
+                  </a:lnTo>
+                  <a:close/>
+                </a:path>
+              </a:pathLst>
+            </a:custGeom>
+            <a:solidFill>
+              <a:srgbClr val="664D00"/>
+            </a:solidFill>
+          </p:spPr>
+          <p:txBody>
+            <a:bodyPr wrap="square" lIns="0" tIns="0" rIns="0" bIns="0" rtlCol="0"/>
+            <a:lstStyle/>
+            <a:p>
+              <a:endParaRPr/>
+            </a:p>
+          </p:txBody>
+        </p:sp>
+        <p:sp>
+          <p:nvSpPr>
+            <p:cNvPr id="8" name="object 17">
+              <a:extLst>
+                <a:ext uri="{FF2B5EF4-FFF2-40B4-BE49-F238E27FC236}">
+                  <a16:creationId xmlns:a16="http://schemas.microsoft.com/office/drawing/2014/main" id="{0CFDE5B8-00FC-543E-465C-4C4202EE52AF}"/>
+                </a:ext>
+              </a:extLst>
+            </p:cNvPr>
+            <p:cNvSpPr/>
+            <p:nvPr/>
+          </p:nvSpPr>
+          <p:spPr>
+            <a:xfrm>
+              <a:off x="3238500" y="9463405"/>
+              <a:ext cx="1282700" cy="343535"/>
+            </a:xfrm>
+            <a:custGeom>
+              <a:avLst/>
+              <a:gdLst/>
+              <a:ahLst/>
+              <a:cxnLst/>
+              <a:rect l="l" t="t" r="r" b="b"/>
+              <a:pathLst>
+                <a:path w="1282700" h="343534">
+                  <a:moveTo>
+                    <a:pt x="0" y="0"/>
+                  </a:moveTo>
+                  <a:lnTo>
+                    <a:pt x="48085" y="6200"/>
+                  </a:lnTo>
+                  <a:lnTo>
+                    <a:pt x="96177" y="11917"/>
+                  </a:lnTo>
+                  <a:lnTo>
+                    <a:pt x="144274" y="17151"/>
+                  </a:lnTo>
+                  <a:lnTo>
+                    <a:pt x="192373" y="21901"/>
+                  </a:lnTo>
+                  <a:lnTo>
+                    <a:pt x="240474" y="26168"/>
+                  </a:lnTo>
+                  <a:lnTo>
+                    <a:pt x="288575" y="29952"/>
+                  </a:lnTo>
+                  <a:lnTo>
+                    <a:pt x="336674" y="33252"/>
+                  </a:lnTo>
+                  <a:lnTo>
+                    <a:pt x="384771" y="36070"/>
+                  </a:lnTo>
+                  <a:lnTo>
+                    <a:pt x="432863" y="38406"/>
+                  </a:lnTo>
+                  <a:lnTo>
+                    <a:pt x="480949" y="40259"/>
+                  </a:lnTo>
+                  <a:lnTo>
+                    <a:pt x="320675" y="75145"/>
+                  </a:lnTo>
+                  <a:lnTo>
+                    <a:pt x="370001" y="78194"/>
+                  </a:lnTo>
+                  <a:lnTo>
+                    <a:pt x="419332" y="80735"/>
+                  </a:lnTo>
+                  <a:lnTo>
+                    <a:pt x="468666" y="82768"/>
+                  </a:lnTo>
+                  <a:lnTo>
+                    <a:pt x="518003" y="84292"/>
+                  </a:lnTo>
+                  <a:lnTo>
+                    <a:pt x="567341" y="85308"/>
+                  </a:lnTo>
+                  <a:lnTo>
+                    <a:pt x="616680" y="85817"/>
+                  </a:lnTo>
+                  <a:lnTo>
+                    <a:pt x="666019" y="85817"/>
+                  </a:lnTo>
+                  <a:lnTo>
+                    <a:pt x="715358" y="85308"/>
+                  </a:lnTo>
+                  <a:lnTo>
+                    <a:pt x="764696" y="84292"/>
+                  </a:lnTo>
+                  <a:lnTo>
+                    <a:pt x="814033" y="82768"/>
+                  </a:lnTo>
+                  <a:lnTo>
+                    <a:pt x="863367" y="80735"/>
+                  </a:lnTo>
+                  <a:lnTo>
+                    <a:pt x="912698" y="78194"/>
+                  </a:lnTo>
+                  <a:lnTo>
+                    <a:pt x="962025" y="75145"/>
+                  </a:lnTo>
+                  <a:lnTo>
+                    <a:pt x="801624" y="40259"/>
+                  </a:lnTo>
+                  <a:lnTo>
+                    <a:pt x="849740" y="38406"/>
+                  </a:lnTo>
+                  <a:lnTo>
+                    <a:pt x="897851" y="36070"/>
+                  </a:lnTo>
+                  <a:lnTo>
+                    <a:pt x="945957" y="33252"/>
+                  </a:lnTo>
+                  <a:lnTo>
+                    <a:pt x="994060" y="29952"/>
+                  </a:lnTo>
+                  <a:lnTo>
+                    <a:pt x="1042161" y="26168"/>
+                  </a:lnTo>
+                  <a:lnTo>
+                    <a:pt x="1090263" y="21901"/>
+                  </a:lnTo>
+                  <a:lnTo>
+                    <a:pt x="1138366" y="17151"/>
+                  </a:lnTo>
+                  <a:lnTo>
+                    <a:pt x="1186472" y="11917"/>
+                  </a:lnTo>
+                  <a:lnTo>
+                    <a:pt x="1234583" y="6200"/>
+                  </a:lnTo>
+                  <a:lnTo>
+                    <a:pt x="1282700" y="0"/>
+                  </a:lnTo>
+                  <a:lnTo>
+                    <a:pt x="1122299" y="147612"/>
+                  </a:lnTo>
+                  <a:lnTo>
+                    <a:pt x="1282700" y="257657"/>
+                  </a:lnTo>
+                  <a:lnTo>
+                    <a:pt x="1229242" y="264515"/>
+                  </a:lnTo>
+                  <a:lnTo>
+                    <a:pt x="1175798" y="270777"/>
+                  </a:lnTo>
+                  <a:lnTo>
+                    <a:pt x="1122362" y="276442"/>
+                  </a:lnTo>
+                  <a:lnTo>
+                    <a:pt x="1068926" y="281511"/>
+                  </a:lnTo>
+                  <a:lnTo>
+                    <a:pt x="1015482" y="285985"/>
+                  </a:lnTo>
+                  <a:lnTo>
+                    <a:pt x="962025" y="289864"/>
+                  </a:lnTo>
+                  <a:lnTo>
+                    <a:pt x="962025" y="332803"/>
+                  </a:lnTo>
+                  <a:lnTo>
+                    <a:pt x="912698" y="335852"/>
+                  </a:lnTo>
+                  <a:lnTo>
+                    <a:pt x="863367" y="338393"/>
+                  </a:lnTo>
+                  <a:lnTo>
+                    <a:pt x="814033" y="340425"/>
+                  </a:lnTo>
+                  <a:lnTo>
+                    <a:pt x="764696" y="341950"/>
+                  </a:lnTo>
+                  <a:lnTo>
+                    <a:pt x="715358" y="342966"/>
+                  </a:lnTo>
+                  <a:lnTo>
+                    <a:pt x="666019" y="343474"/>
+                  </a:lnTo>
+                  <a:lnTo>
+                    <a:pt x="616680" y="343474"/>
+                  </a:lnTo>
+                  <a:lnTo>
+                    <a:pt x="567341" y="342966"/>
+                  </a:lnTo>
+                  <a:lnTo>
+                    <a:pt x="518003" y="341950"/>
+                  </a:lnTo>
+                  <a:lnTo>
+                    <a:pt x="468666" y="340425"/>
+                  </a:lnTo>
+                  <a:lnTo>
+                    <a:pt x="419332" y="338393"/>
+                  </a:lnTo>
+                  <a:lnTo>
+                    <a:pt x="370001" y="335852"/>
+                  </a:lnTo>
+                  <a:lnTo>
+                    <a:pt x="320675" y="332803"/>
+                  </a:lnTo>
+                  <a:lnTo>
+                    <a:pt x="320675" y="289864"/>
+                  </a:lnTo>
+                  <a:lnTo>
+                    <a:pt x="267217" y="285985"/>
+                  </a:lnTo>
+                  <a:lnTo>
+                    <a:pt x="213773" y="281511"/>
+                  </a:lnTo>
+                  <a:lnTo>
+                    <a:pt x="160337" y="276442"/>
+                  </a:lnTo>
+                  <a:lnTo>
+                    <a:pt x="106901" y="270777"/>
+                  </a:lnTo>
+                  <a:lnTo>
+                    <a:pt x="53457" y="264515"/>
+                  </a:lnTo>
+                  <a:lnTo>
+                    <a:pt x="0" y="257657"/>
+                  </a:lnTo>
+                  <a:lnTo>
+                    <a:pt x="160274" y="147612"/>
+                  </a:lnTo>
+                  <a:lnTo>
+                    <a:pt x="0" y="0"/>
+                  </a:lnTo>
+                  <a:close/>
+                </a:path>
+                <a:path w="1282700" h="343534">
+                  <a:moveTo>
+                    <a:pt x="320675" y="289864"/>
+                  </a:moveTo>
+                  <a:lnTo>
+                    <a:pt x="320675" y="75145"/>
+                  </a:lnTo>
+                </a:path>
+                <a:path w="1282700" h="343534">
+                  <a:moveTo>
+                    <a:pt x="962025" y="75145"/>
+                  </a:moveTo>
+                  <a:lnTo>
+                    <a:pt x="962025" y="289864"/>
+                  </a:lnTo>
+                </a:path>
+                <a:path w="1282700" h="343534">
+                  <a:moveTo>
+                    <a:pt x="480949" y="40259"/>
+                  </a:moveTo>
+                  <a:lnTo>
+                    <a:pt x="480949" y="83197"/>
+                  </a:lnTo>
+                </a:path>
+                <a:path w="1282700" h="343534">
+                  <a:moveTo>
+                    <a:pt x="801624" y="83197"/>
+                  </a:moveTo>
+                  <a:lnTo>
+                    <a:pt x="801624" y="40259"/>
+                  </a:lnTo>
+                </a:path>
+              </a:pathLst>
+            </a:custGeom>
+            <a:ln w="9525">
+              <a:solidFill>
+                <a:srgbClr val="FFC000"/>
+              </a:solidFill>
+            </a:ln>
+          </p:spPr>
+          <p:txBody>
+            <a:bodyPr wrap="square" lIns="0" tIns="0" rIns="0" bIns="0" rtlCol="0"/>
+            <a:lstStyle/>
+            <a:p>
+              <a:endParaRPr dirty="0"/>
+            </a:p>
+          </p:txBody>
+        </p:sp>
+      </p:grpSp>
+      <p:sp>
+        <p:nvSpPr>
+          <p:cNvPr id="9" name="CuadroTexto 8">
+            <a:extLst>
+              <a:ext uri="{FF2B5EF4-FFF2-40B4-BE49-F238E27FC236}">
+                <a16:creationId xmlns:a16="http://schemas.microsoft.com/office/drawing/2014/main" id="{C3AAE22D-A715-25C9-3268-88385C1E6EC2}"/>
+              </a:ext>
+            </a:extLst>
+          </p:cNvPr>
+          <p:cNvSpPr txBox="1"/>
+          <p:nvPr/>
+        </p:nvSpPr>
+        <p:spPr>
+          <a:xfrm>
+            <a:off x="6093541" y="6421065"/>
+            <a:ext cx="575187" cy="400110"/>
+          </a:xfrm>
+          <a:prstGeom prst="rect">
+            <a:avLst/>
+          </a:prstGeom>
+          <a:noFill/>
+        </p:spPr>
+        <p:txBody>
+          <a:bodyPr wrap="square" rtlCol="0">
+            <a:spAutoFit/>
+          </a:bodyPr>
+          <a:lstStyle/>
+          <a:p>
+            <a:r>
+              <a:rPr lang="es-MX" sz="2000" dirty="0">
+                <a:solidFill>
+                  <a:schemeClr val="bg1"/>
+                </a:solidFill>
+              </a:rPr>
+              <a:t>9</a:t>
+            </a:r>
+          </a:p>
+        </p:txBody>
+      </p:sp>
+      <p:sp>
+        <p:nvSpPr>
+          <p:cNvPr id="10" name="Rectángulo 9">
+            <a:extLst>
+              <a:ext uri="{FF2B5EF4-FFF2-40B4-BE49-F238E27FC236}">
+                <a16:creationId xmlns:a16="http://schemas.microsoft.com/office/drawing/2014/main" id="{F0A3EE6C-DFA2-0245-9DAC-A91B11E90405}"/>
+              </a:ext>
+            </a:extLst>
+          </p:cNvPr>
+          <p:cNvSpPr/>
+          <p:nvPr/>
+        </p:nvSpPr>
+        <p:spPr>
+          <a:xfrm>
+            <a:off x="1" y="0"/>
+            <a:ext cx="12192000" cy="438277"/>
+          </a:xfrm>
+          <a:prstGeom prst="rect">
+            <a:avLst/>
+          </a:prstGeom>
+          <a:solidFill>
+            <a:schemeClr val="accent6">
+              <a:lumMod val="75000"/>
+            </a:schemeClr>
+          </a:solidFill>
+        </p:spPr>
+        <p:style>
+          <a:lnRef idx="2">
+            <a:schemeClr val="accent1">
+              <a:shade val="15000"/>
+            </a:schemeClr>
+          </a:lnRef>
+          <a:fillRef idx="1">
+            <a:schemeClr val="accent1"/>
+          </a:fillRef>
+          <a:effectRef idx="0">
+            <a:schemeClr val="accent1"/>
+          </a:effectRef>
+          <a:fontRef idx="minor">
+            <a:schemeClr val="lt1"/>
+          </a:fontRef>
+        </p:style>
+        <p:txBody>
+          <a:bodyPr rtlCol="0" anchor="ctr"/>
+          <a:lstStyle/>
+          <a:p>
+            <a:pPr algn="r"/>
+            <a:r>
+              <a:rPr lang="es-MX" dirty="0">
+                <a:solidFill>
+                  <a:srgbClr val="FFFF00"/>
+                </a:solidFill>
+                <a:latin typeface="Berlin Sans FB Demi" panose="020E0802020502020306" pitchFamily="34" charset="0"/>
+              </a:rPr>
+              <a:t>MANUAL TECNICO</a:t>
+            </a:r>
+          </a:p>
+        </p:txBody>
+      </p:sp>
+      <p:pic>
+        <p:nvPicPr>
+          <p:cNvPr id="11" name="Imagen 10" descr="Diagrama&#10;&#10;Descripción generada automáticamente">
+            <a:extLst>
+              <a:ext uri="{FF2B5EF4-FFF2-40B4-BE49-F238E27FC236}">
+                <a16:creationId xmlns:a16="http://schemas.microsoft.com/office/drawing/2014/main" id="{5F4DBFA2-AE7A-AE91-FA1C-7CB11833534C}"/>
+              </a:ext>
+            </a:extLst>
+          </p:cNvPr>
+          <p:cNvPicPr>
+            <a:picLocks noChangeAspect="1"/>
+          </p:cNvPicPr>
+          <p:nvPr/>
+        </p:nvPicPr>
+        <p:blipFill>
+          <a:blip r:embed="rId2">
+            <a:extLst>
+              <a:ext uri="{28A0092B-C50C-407E-A947-70E740481C1C}">
+                <a14:useLocalDpi xmlns:a14="http://schemas.microsoft.com/office/drawing/2010/main" val="0"/>
+              </a:ext>
+            </a:extLst>
+          </a:blip>
+          <a:stretch>
+            <a:fillRect/>
+          </a:stretch>
+        </p:blipFill>
+        <p:spPr>
+          <a:xfrm>
+            <a:off x="2340076" y="1470522"/>
+            <a:ext cx="7939550" cy="4776693"/>
+          </a:xfrm>
+          <a:prstGeom prst="rect">
+            <a:avLst/>
+          </a:prstGeom>
+          <a:ln>
+            <a:noFill/>
+          </a:ln>
+          <a:effectLst>
+            <a:outerShdw blurRad="292100" dist="139700" dir="2700000" algn="tl" rotWithShape="0">
+              <a:srgbClr val="333333">
+                <a:alpha val="65000"/>
+              </a:srgbClr>
+            </a:outerShdw>
+          </a:effectLst>
+        </p:spPr>
+      </p:pic>
+    </p:spTree>
+    <p:extLst>
+      <p:ext uri="{BB962C8B-B14F-4D97-AF65-F5344CB8AC3E}">
+        <p14:creationId xmlns:p14="http://schemas.microsoft.com/office/powerpoint/2010/main" val="3087035280"/>
       </p:ext>
     </p:extLst>
   </p:cSld>

</xml_diff>